<commit_message>
updated templates to gray
</commit_message>
<xml_diff>
--- a/template_lyrics.pptx
+++ b/template_lyrics.pptx
@@ -5,9 +5,9 @@
     <p:sldMasterId id="2147483648" r:id="rId1"/>
   </p:sldMasterIdLst>
   <p:sldIdLst>
-    <p:sldId id="256" r:id="rId2"/>
-    <p:sldId id="257" r:id="rId3"/>
-    <p:sldId id="277" r:id="rId4"/>
+    <p:sldId id="257" r:id="rId2"/>
+    <p:sldId id="277" r:id="rId3"/>
+    <p:sldId id="276" r:id="rId4"/>
   </p:sldIdLst>
   <p:sldSz cx="9144000" cy="5715000" type="screen16x10"/>
   <p:notesSz cx="6858000" cy="9144000"/>
@@ -15,122 +15,122 @@
     <a:defPPr>
       <a:defRPr lang="en-US"/>
     </a:defPPr>
-    <a:lvl1pPr algn="l" rtl="0" eaLnBrk="0" fontAlgn="base" hangingPunct="0">
+    <a:lvl1pPr algn="l" rtl="0" fontAlgn="base">
       <a:spcBef>
         <a:spcPct val="0"/>
       </a:spcBef>
       <a:spcAft>
         <a:spcPct val="0"/>
       </a:spcAft>
-      <a:defRPr sz="3500" b="1" kern="1200">
+      <a:defRPr sz="1092" kern="1200">
         <a:solidFill>
           <a:schemeClr val="tx1"/>
         </a:solidFill>
-        <a:latin typeface="Arial" panose="020B0604020202020204" pitchFamily="34" charset="0"/>
+        <a:latin typeface="Arial" charset="0"/>
         <a:ea typeface="+mn-ea"/>
         <a:cs typeface="+mn-cs"/>
       </a:defRPr>
     </a:lvl1pPr>
-    <a:lvl2pPr marL="355600" indent="101600" algn="l" rtl="0" eaLnBrk="0" fontAlgn="base" hangingPunct="0">
+    <a:lvl2pPr marL="356616" algn="l" rtl="0" fontAlgn="base">
       <a:spcBef>
         <a:spcPct val="0"/>
       </a:spcBef>
       <a:spcAft>
         <a:spcPct val="0"/>
       </a:spcAft>
-      <a:defRPr sz="3500" b="1" kern="1200">
+      <a:defRPr sz="1092" kern="1200">
         <a:solidFill>
           <a:schemeClr val="tx1"/>
         </a:solidFill>
-        <a:latin typeface="Arial" panose="020B0604020202020204" pitchFamily="34" charset="0"/>
+        <a:latin typeface="Arial" charset="0"/>
         <a:ea typeface="+mn-ea"/>
         <a:cs typeface="+mn-cs"/>
       </a:defRPr>
     </a:lvl2pPr>
-    <a:lvl3pPr marL="712788" indent="201613" algn="l" rtl="0" eaLnBrk="0" fontAlgn="base" hangingPunct="0">
+    <a:lvl3pPr marL="713232" algn="l" rtl="0" fontAlgn="base">
       <a:spcBef>
         <a:spcPct val="0"/>
       </a:spcBef>
       <a:spcAft>
         <a:spcPct val="0"/>
       </a:spcAft>
-      <a:defRPr sz="3500" b="1" kern="1200">
+      <a:defRPr sz="1092" kern="1200">
         <a:solidFill>
           <a:schemeClr val="tx1"/>
         </a:solidFill>
-        <a:latin typeface="Arial" panose="020B0604020202020204" pitchFamily="34" charset="0"/>
+        <a:latin typeface="Arial" charset="0"/>
         <a:ea typeface="+mn-ea"/>
         <a:cs typeface="+mn-cs"/>
       </a:defRPr>
     </a:lvl3pPr>
-    <a:lvl4pPr marL="1068388" indent="303213" algn="l" rtl="0" eaLnBrk="0" fontAlgn="base" hangingPunct="0">
+    <a:lvl4pPr marL="1069848" algn="l" rtl="0" fontAlgn="base">
       <a:spcBef>
         <a:spcPct val="0"/>
       </a:spcBef>
       <a:spcAft>
         <a:spcPct val="0"/>
       </a:spcAft>
-      <a:defRPr sz="3500" b="1" kern="1200">
+      <a:defRPr sz="1092" kern="1200">
         <a:solidFill>
           <a:schemeClr val="tx1"/>
         </a:solidFill>
-        <a:latin typeface="Arial" panose="020B0604020202020204" pitchFamily="34" charset="0"/>
+        <a:latin typeface="Arial" charset="0"/>
         <a:ea typeface="+mn-ea"/>
         <a:cs typeface="+mn-cs"/>
       </a:defRPr>
     </a:lvl4pPr>
-    <a:lvl5pPr marL="1425575" indent="403225" algn="l" rtl="0" eaLnBrk="0" fontAlgn="base" hangingPunct="0">
+    <a:lvl5pPr marL="1426464" algn="l" rtl="0" fontAlgn="base">
       <a:spcBef>
         <a:spcPct val="0"/>
       </a:spcBef>
       <a:spcAft>
         <a:spcPct val="0"/>
       </a:spcAft>
-      <a:defRPr sz="3500" b="1" kern="1200">
+      <a:defRPr sz="1092" kern="1200">
         <a:solidFill>
           <a:schemeClr val="tx1"/>
         </a:solidFill>
-        <a:latin typeface="Arial" panose="020B0604020202020204" pitchFamily="34" charset="0"/>
+        <a:latin typeface="Arial" charset="0"/>
         <a:ea typeface="+mn-ea"/>
         <a:cs typeface="+mn-cs"/>
       </a:defRPr>
     </a:lvl5pPr>
-    <a:lvl6pPr marL="2286000" algn="l" defTabSz="914400" rtl="0" eaLnBrk="1" latinLnBrk="0" hangingPunct="1">
-      <a:defRPr sz="3500" b="1" kern="1200">
+    <a:lvl6pPr marL="1783080" algn="l" defTabSz="713232" rtl="0" eaLnBrk="1" latinLnBrk="0" hangingPunct="1">
+      <a:defRPr sz="1092" kern="1200">
         <a:solidFill>
           <a:schemeClr val="tx1"/>
         </a:solidFill>
-        <a:latin typeface="Arial" panose="020B0604020202020204" pitchFamily="34" charset="0"/>
+        <a:latin typeface="Arial" charset="0"/>
         <a:ea typeface="+mn-ea"/>
         <a:cs typeface="+mn-cs"/>
       </a:defRPr>
     </a:lvl6pPr>
-    <a:lvl7pPr marL="2743200" algn="l" defTabSz="914400" rtl="0" eaLnBrk="1" latinLnBrk="0" hangingPunct="1">
-      <a:defRPr sz="3500" b="1" kern="1200">
+    <a:lvl7pPr marL="2139696" algn="l" defTabSz="713232" rtl="0" eaLnBrk="1" latinLnBrk="0" hangingPunct="1">
+      <a:defRPr sz="1092" kern="1200">
         <a:solidFill>
           <a:schemeClr val="tx1"/>
         </a:solidFill>
-        <a:latin typeface="Arial" panose="020B0604020202020204" pitchFamily="34" charset="0"/>
+        <a:latin typeface="Arial" charset="0"/>
         <a:ea typeface="+mn-ea"/>
         <a:cs typeface="+mn-cs"/>
       </a:defRPr>
     </a:lvl7pPr>
-    <a:lvl8pPr marL="3200400" algn="l" defTabSz="914400" rtl="0" eaLnBrk="1" latinLnBrk="0" hangingPunct="1">
-      <a:defRPr sz="3500" b="1" kern="1200">
+    <a:lvl8pPr marL="2496312" algn="l" defTabSz="713232" rtl="0" eaLnBrk="1" latinLnBrk="0" hangingPunct="1">
+      <a:defRPr sz="1092" kern="1200">
         <a:solidFill>
           <a:schemeClr val="tx1"/>
         </a:solidFill>
-        <a:latin typeface="Arial" panose="020B0604020202020204" pitchFamily="34" charset="0"/>
+        <a:latin typeface="Arial" charset="0"/>
         <a:ea typeface="+mn-ea"/>
         <a:cs typeface="+mn-cs"/>
       </a:defRPr>
     </a:lvl8pPr>
-    <a:lvl9pPr marL="3657600" algn="l" defTabSz="914400" rtl="0" eaLnBrk="1" latinLnBrk="0" hangingPunct="1">
-      <a:defRPr sz="3500" b="1" kern="1200">
+    <a:lvl9pPr marL="2852928" algn="l" defTabSz="713232" rtl="0" eaLnBrk="1" latinLnBrk="0" hangingPunct="1">
+      <a:defRPr sz="1092" kern="1200">
         <a:solidFill>
           <a:schemeClr val="tx1"/>
         </a:solidFill>
-        <a:latin typeface="Arial" panose="020B0604020202020204" pitchFamily="34" charset="0"/>
+        <a:latin typeface="Arial" charset="0"/>
         <a:ea typeface="+mn-ea"/>
         <a:cs typeface="+mn-cs"/>
       </a:defRPr>
@@ -139,12 +139,12 @@
   <p:extLst>
     <p:ext uri="{EFAFB233-063F-42B5-8137-9DF3F51BA10A}">
       <p15:sldGuideLst xmlns:p15="http://schemas.microsoft.com/office/powerpoint/2012/main">
-        <p15:guide id="1" orient="horz" pos="1800">
+        <p15:guide id="1" orient="horz" pos="3336" userDrawn="1">
           <p15:clr>
             <a:srgbClr val="A4A3A4"/>
           </p15:clr>
         </p15:guide>
-        <p15:guide id="2" pos="2880">
+        <p15:guide id="2" pos="288" userDrawn="1">
           <p15:clr>
             <a:srgbClr val="A4A3A4"/>
           </p15:clr>
@@ -265,13 +265,7 @@
       </p:sp>
       <p:sp>
         <p:nvSpPr>
-          <p:cNvPr id="4" name="Rectangle 4">
-            <a:extLst>
-              <a:ext uri="{FF2B5EF4-FFF2-40B4-BE49-F238E27FC236}">
-                <a16:creationId xmlns:a16="http://schemas.microsoft.com/office/drawing/2014/main" id="{FEEC0F8E-78E3-49B1-BDD4-80D4D16AB3F0}"/>
-              </a:ext>
-            </a:extLst>
-          </p:cNvPr>
+          <p:cNvPr id="4" name="Rectangle 4"/>
           <p:cNvSpPr>
             <a:spLocks noGrp="1" noChangeArrowheads="1"/>
           </p:cNvSpPr>
@@ -299,13 +293,7 @@
       </p:sp>
       <p:sp>
         <p:nvSpPr>
-          <p:cNvPr id="5" name="Rectangle 5">
-            <a:extLst>
-              <a:ext uri="{FF2B5EF4-FFF2-40B4-BE49-F238E27FC236}">
-                <a16:creationId xmlns:a16="http://schemas.microsoft.com/office/drawing/2014/main" id="{F0958880-FF35-47C2-9641-7282F94657FE}"/>
-              </a:ext>
-            </a:extLst>
-          </p:cNvPr>
+          <p:cNvPr id="5" name="Rectangle 5"/>
           <p:cNvSpPr>
             <a:spLocks noGrp="1" noChangeArrowheads="1"/>
           </p:cNvSpPr>
@@ -333,13 +321,7 @@
       </p:sp>
       <p:sp>
         <p:nvSpPr>
-          <p:cNvPr id="6" name="Rectangle 6">
-            <a:extLst>
-              <a:ext uri="{FF2B5EF4-FFF2-40B4-BE49-F238E27FC236}">
-                <a16:creationId xmlns:a16="http://schemas.microsoft.com/office/drawing/2014/main" id="{F7AE349C-F746-4B56-AE27-AB09D933B025}"/>
-              </a:ext>
-            </a:extLst>
-          </p:cNvPr>
+          <p:cNvPr id="6" name="Rectangle 6"/>
           <p:cNvSpPr>
             <a:spLocks noGrp="1" noChangeArrowheads="1"/>
           </p:cNvSpPr>
@@ -361,21 +343,21 @@
             <a:pPr>
               <a:defRPr/>
             </a:pPr>
-            <a:fld id="{A9E19C40-A7F5-4D8F-8418-2366A8E0AB1B}" type="slidenum">
-              <a:rPr lang="en-US" altLang="en-US"/>
+            <a:fld id="{3406B22A-D0B8-4411-94A5-D1481DFF3D97}" type="slidenum">
+              <a:rPr lang="en-US"/>
               <a:pPr>
                 <a:defRPr/>
               </a:pPr>
               <a:t>‹#›</a:t>
             </a:fld>
-            <a:endParaRPr lang="en-US" altLang="en-US"/>
+            <a:endParaRPr lang="en-US"/>
           </a:p>
         </p:txBody>
       </p:sp>
     </p:spTree>
     <p:extLst>
       <p:ext uri="{BB962C8B-B14F-4D97-AF65-F5344CB8AC3E}">
-        <p14:creationId xmlns:p14="http://schemas.microsoft.com/office/powerpoint/2010/main" val="2353783407"/>
+        <p14:creationId xmlns:p14="http://schemas.microsoft.com/office/powerpoint/2010/main" val="3611337458"/>
       </p:ext>
     </p:extLst>
   </p:cSld>
@@ -477,13 +459,7 @@
       </p:sp>
       <p:sp>
         <p:nvSpPr>
-          <p:cNvPr id="4" name="Rectangle 4">
-            <a:extLst>
-              <a:ext uri="{FF2B5EF4-FFF2-40B4-BE49-F238E27FC236}">
-                <a16:creationId xmlns:a16="http://schemas.microsoft.com/office/drawing/2014/main" id="{A18CDA51-D5FC-4071-BD15-798B7CCEDF51}"/>
-              </a:ext>
-            </a:extLst>
-          </p:cNvPr>
+          <p:cNvPr id="4" name="Rectangle 4"/>
           <p:cNvSpPr>
             <a:spLocks noGrp="1" noChangeArrowheads="1"/>
           </p:cNvSpPr>
@@ -511,13 +487,7 @@
       </p:sp>
       <p:sp>
         <p:nvSpPr>
-          <p:cNvPr id="5" name="Rectangle 5">
-            <a:extLst>
-              <a:ext uri="{FF2B5EF4-FFF2-40B4-BE49-F238E27FC236}">
-                <a16:creationId xmlns:a16="http://schemas.microsoft.com/office/drawing/2014/main" id="{F458AA8A-E981-427E-A86B-5FADD5827AC3}"/>
-              </a:ext>
-            </a:extLst>
-          </p:cNvPr>
+          <p:cNvPr id="5" name="Rectangle 5"/>
           <p:cNvSpPr>
             <a:spLocks noGrp="1" noChangeArrowheads="1"/>
           </p:cNvSpPr>
@@ -545,13 +515,7 @@
       </p:sp>
       <p:sp>
         <p:nvSpPr>
-          <p:cNvPr id="6" name="Rectangle 6">
-            <a:extLst>
-              <a:ext uri="{FF2B5EF4-FFF2-40B4-BE49-F238E27FC236}">
-                <a16:creationId xmlns:a16="http://schemas.microsoft.com/office/drawing/2014/main" id="{6E3D64A4-1926-48CC-A3CF-8BE2A4DC35B5}"/>
-              </a:ext>
-            </a:extLst>
-          </p:cNvPr>
+          <p:cNvPr id="6" name="Rectangle 6"/>
           <p:cNvSpPr>
             <a:spLocks noGrp="1" noChangeArrowheads="1"/>
           </p:cNvSpPr>
@@ -573,21 +537,21 @@
             <a:pPr>
               <a:defRPr/>
             </a:pPr>
-            <a:fld id="{CD7E9DCF-7B87-4CE2-A68E-7289F86795F8}" type="slidenum">
-              <a:rPr lang="en-US" altLang="en-US"/>
+            <a:fld id="{E91D6AA8-9B5A-4D3F-922F-1E735A0F9AF5}" type="slidenum">
+              <a:rPr lang="en-US"/>
               <a:pPr>
                 <a:defRPr/>
               </a:pPr>
               <a:t>‹#›</a:t>
             </a:fld>
-            <a:endParaRPr lang="en-US" altLang="en-US"/>
+            <a:endParaRPr lang="en-US"/>
           </a:p>
         </p:txBody>
       </p:sp>
     </p:spTree>
     <p:extLst>
       <p:ext uri="{BB962C8B-B14F-4D97-AF65-F5344CB8AC3E}">
-        <p14:creationId xmlns:p14="http://schemas.microsoft.com/office/powerpoint/2010/main" val="4045809363"/>
+        <p14:creationId xmlns:p14="http://schemas.microsoft.com/office/powerpoint/2010/main" val="1113458420"/>
       </p:ext>
     </p:extLst>
   </p:cSld>
@@ -699,13 +663,7 @@
       </p:sp>
       <p:sp>
         <p:nvSpPr>
-          <p:cNvPr id="4" name="Rectangle 4">
-            <a:extLst>
-              <a:ext uri="{FF2B5EF4-FFF2-40B4-BE49-F238E27FC236}">
-                <a16:creationId xmlns:a16="http://schemas.microsoft.com/office/drawing/2014/main" id="{D955BE08-A76C-41A5-8392-5B70400E67C2}"/>
-              </a:ext>
-            </a:extLst>
-          </p:cNvPr>
+          <p:cNvPr id="4" name="Rectangle 4"/>
           <p:cNvSpPr>
             <a:spLocks noGrp="1" noChangeArrowheads="1"/>
           </p:cNvSpPr>
@@ -733,13 +691,7 @@
       </p:sp>
       <p:sp>
         <p:nvSpPr>
-          <p:cNvPr id="5" name="Rectangle 5">
-            <a:extLst>
-              <a:ext uri="{FF2B5EF4-FFF2-40B4-BE49-F238E27FC236}">
-                <a16:creationId xmlns:a16="http://schemas.microsoft.com/office/drawing/2014/main" id="{EF90D1D0-BE12-476A-BA5E-0D59E821AEC1}"/>
-              </a:ext>
-            </a:extLst>
-          </p:cNvPr>
+          <p:cNvPr id="5" name="Rectangle 5"/>
           <p:cNvSpPr>
             <a:spLocks noGrp="1" noChangeArrowheads="1"/>
           </p:cNvSpPr>
@@ -767,13 +719,7 @@
       </p:sp>
       <p:sp>
         <p:nvSpPr>
-          <p:cNvPr id="6" name="Rectangle 6">
-            <a:extLst>
-              <a:ext uri="{FF2B5EF4-FFF2-40B4-BE49-F238E27FC236}">
-                <a16:creationId xmlns:a16="http://schemas.microsoft.com/office/drawing/2014/main" id="{BB27457D-FCD1-437D-B4F2-016F9491759F}"/>
-              </a:ext>
-            </a:extLst>
-          </p:cNvPr>
+          <p:cNvPr id="6" name="Rectangle 6"/>
           <p:cNvSpPr>
             <a:spLocks noGrp="1" noChangeArrowheads="1"/>
           </p:cNvSpPr>
@@ -795,21 +741,21 @@
             <a:pPr>
               <a:defRPr/>
             </a:pPr>
-            <a:fld id="{BE2521EC-4F0B-4A55-9B6B-F67BD20DD6C5}" type="slidenum">
-              <a:rPr lang="en-US" altLang="en-US"/>
+            <a:fld id="{D126855D-9629-49F3-BB86-449553166536}" type="slidenum">
+              <a:rPr lang="en-US"/>
               <a:pPr>
                 <a:defRPr/>
               </a:pPr>
               <a:t>‹#›</a:t>
             </a:fld>
-            <a:endParaRPr lang="en-US" altLang="en-US"/>
+            <a:endParaRPr lang="en-US"/>
           </a:p>
         </p:txBody>
       </p:sp>
     </p:spTree>
     <p:extLst>
       <p:ext uri="{BB962C8B-B14F-4D97-AF65-F5344CB8AC3E}">
-        <p14:creationId xmlns:p14="http://schemas.microsoft.com/office/powerpoint/2010/main" val="4212359330"/>
+        <p14:creationId xmlns:p14="http://schemas.microsoft.com/office/powerpoint/2010/main" val="664635676"/>
       </p:ext>
     </p:extLst>
   </p:cSld>
@@ -911,13 +857,7 @@
       </p:sp>
       <p:sp>
         <p:nvSpPr>
-          <p:cNvPr id="4" name="Rectangle 4">
-            <a:extLst>
-              <a:ext uri="{FF2B5EF4-FFF2-40B4-BE49-F238E27FC236}">
-                <a16:creationId xmlns:a16="http://schemas.microsoft.com/office/drawing/2014/main" id="{F2989913-B25C-4A80-AB34-17ED0DDF4A68}"/>
-              </a:ext>
-            </a:extLst>
-          </p:cNvPr>
+          <p:cNvPr id="4" name="Rectangle 4"/>
           <p:cNvSpPr>
             <a:spLocks noGrp="1" noChangeArrowheads="1"/>
           </p:cNvSpPr>
@@ -945,13 +885,7 @@
       </p:sp>
       <p:sp>
         <p:nvSpPr>
-          <p:cNvPr id="5" name="Rectangle 5">
-            <a:extLst>
-              <a:ext uri="{FF2B5EF4-FFF2-40B4-BE49-F238E27FC236}">
-                <a16:creationId xmlns:a16="http://schemas.microsoft.com/office/drawing/2014/main" id="{5A7ECAF8-0031-473E-9ECC-9C1A06FAA738}"/>
-              </a:ext>
-            </a:extLst>
-          </p:cNvPr>
+          <p:cNvPr id="5" name="Rectangle 5"/>
           <p:cNvSpPr>
             <a:spLocks noGrp="1" noChangeArrowheads="1"/>
           </p:cNvSpPr>
@@ -979,13 +913,7 @@
       </p:sp>
       <p:sp>
         <p:nvSpPr>
-          <p:cNvPr id="6" name="Rectangle 6">
-            <a:extLst>
-              <a:ext uri="{FF2B5EF4-FFF2-40B4-BE49-F238E27FC236}">
-                <a16:creationId xmlns:a16="http://schemas.microsoft.com/office/drawing/2014/main" id="{A391931A-0595-4609-9B4D-3236B5A344A3}"/>
-              </a:ext>
-            </a:extLst>
-          </p:cNvPr>
+          <p:cNvPr id="6" name="Rectangle 6"/>
           <p:cNvSpPr>
             <a:spLocks noGrp="1" noChangeArrowheads="1"/>
           </p:cNvSpPr>
@@ -1007,21 +935,21 @@
             <a:pPr>
               <a:defRPr/>
             </a:pPr>
-            <a:fld id="{5DC3AB01-CFE4-4CDF-899F-99823AB685E8}" type="slidenum">
-              <a:rPr lang="en-US" altLang="en-US"/>
+            <a:fld id="{1F0841E5-AFEE-446A-A149-8DCE0EAD6824}" type="slidenum">
+              <a:rPr lang="en-US"/>
               <a:pPr>
                 <a:defRPr/>
               </a:pPr>
               <a:t>‹#›</a:t>
             </a:fld>
-            <a:endParaRPr lang="en-US" altLang="en-US"/>
+            <a:endParaRPr lang="en-US"/>
           </a:p>
         </p:txBody>
       </p:sp>
     </p:spTree>
     <p:extLst>
       <p:ext uri="{BB962C8B-B14F-4D97-AF65-F5344CB8AC3E}">
-        <p14:creationId xmlns:p14="http://schemas.microsoft.com/office/powerpoint/2010/main" val="2467518946"/>
+        <p14:creationId xmlns:p14="http://schemas.microsoft.com/office/powerpoint/2010/main" val="179079506"/>
       </p:ext>
     </p:extLst>
   </p:cSld>
@@ -1146,13 +1074,7 @@
       </p:sp>
       <p:sp>
         <p:nvSpPr>
-          <p:cNvPr id="4" name="Rectangle 4">
-            <a:extLst>
-              <a:ext uri="{FF2B5EF4-FFF2-40B4-BE49-F238E27FC236}">
-                <a16:creationId xmlns:a16="http://schemas.microsoft.com/office/drawing/2014/main" id="{751B35A2-73FD-46A2-AC60-0D0E6B5FC911}"/>
-              </a:ext>
-            </a:extLst>
-          </p:cNvPr>
+          <p:cNvPr id="4" name="Rectangle 4"/>
           <p:cNvSpPr>
             <a:spLocks noGrp="1" noChangeArrowheads="1"/>
           </p:cNvSpPr>
@@ -1180,13 +1102,7 @@
       </p:sp>
       <p:sp>
         <p:nvSpPr>
-          <p:cNvPr id="5" name="Rectangle 5">
-            <a:extLst>
-              <a:ext uri="{FF2B5EF4-FFF2-40B4-BE49-F238E27FC236}">
-                <a16:creationId xmlns:a16="http://schemas.microsoft.com/office/drawing/2014/main" id="{D73B4205-BD1B-4047-B69D-E6A6824B0E85}"/>
-              </a:ext>
-            </a:extLst>
-          </p:cNvPr>
+          <p:cNvPr id="5" name="Rectangle 5"/>
           <p:cNvSpPr>
             <a:spLocks noGrp="1" noChangeArrowheads="1"/>
           </p:cNvSpPr>
@@ -1214,13 +1130,7 @@
       </p:sp>
       <p:sp>
         <p:nvSpPr>
-          <p:cNvPr id="6" name="Rectangle 6">
-            <a:extLst>
-              <a:ext uri="{FF2B5EF4-FFF2-40B4-BE49-F238E27FC236}">
-                <a16:creationId xmlns:a16="http://schemas.microsoft.com/office/drawing/2014/main" id="{9382B283-9B4D-4810-A720-62322A41C496}"/>
-              </a:ext>
-            </a:extLst>
-          </p:cNvPr>
+          <p:cNvPr id="6" name="Rectangle 6"/>
           <p:cNvSpPr>
             <a:spLocks noGrp="1" noChangeArrowheads="1"/>
           </p:cNvSpPr>
@@ -1242,21 +1152,21 @@
             <a:pPr>
               <a:defRPr/>
             </a:pPr>
-            <a:fld id="{6E141D92-A251-4354-A2B4-32ECFE468D83}" type="slidenum">
-              <a:rPr lang="en-US" altLang="en-US"/>
+            <a:fld id="{C3E502B3-FE7B-412B-8713-B341A48E7986}" type="slidenum">
+              <a:rPr lang="en-US"/>
               <a:pPr>
                 <a:defRPr/>
               </a:pPr>
               <a:t>‹#›</a:t>
             </a:fld>
-            <a:endParaRPr lang="en-US" altLang="en-US"/>
+            <a:endParaRPr lang="en-US"/>
           </a:p>
         </p:txBody>
       </p:sp>
     </p:spTree>
     <p:extLst>
       <p:ext uri="{BB962C8B-B14F-4D97-AF65-F5344CB8AC3E}">
-        <p14:creationId xmlns:p14="http://schemas.microsoft.com/office/powerpoint/2010/main" val="1582010913"/>
+        <p14:creationId xmlns:p14="http://schemas.microsoft.com/office/powerpoint/2010/main" val="3411365527"/>
       </p:ext>
     </p:extLst>
   </p:cSld>
@@ -1475,13 +1385,7 @@
       </p:sp>
       <p:sp>
         <p:nvSpPr>
-          <p:cNvPr id="5" name="Rectangle 4">
-            <a:extLst>
-              <a:ext uri="{FF2B5EF4-FFF2-40B4-BE49-F238E27FC236}">
-                <a16:creationId xmlns:a16="http://schemas.microsoft.com/office/drawing/2014/main" id="{1B0D52DC-85C0-4BA5-A85F-CFFE093ADD81}"/>
-              </a:ext>
-            </a:extLst>
-          </p:cNvPr>
+          <p:cNvPr id="5" name="Rectangle 4"/>
           <p:cNvSpPr>
             <a:spLocks noGrp="1" noChangeArrowheads="1"/>
           </p:cNvSpPr>
@@ -1509,13 +1413,7 @@
       </p:sp>
       <p:sp>
         <p:nvSpPr>
-          <p:cNvPr id="6" name="Rectangle 5">
-            <a:extLst>
-              <a:ext uri="{FF2B5EF4-FFF2-40B4-BE49-F238E27FC236}">
-                <a16:creationId xmlns:a16="http://schemas.microsoft.com/office/drawing/2014/main" id="{0AFD1BB3-DE1F-4BC9-AC91-3C68ED7C061D}"/>
-              </a:ext>
-            </a:extLst>
-          </p:cNvPr>
+          <p:cNvPr id="6" name="Rectangle 5"/>
           <p:cNvSpPr>
             <a:spLocks noGrp="1" noChangeArrowheads="1"/>
           </p:cNvSpPr>
@@ -1543,13 +1441,7 @@
       </p:sp>
       <p:sp>
         <p:nvSpPr>
-          <p:cNvPr id="7" name="Rectangle 6">
-            <a:extLst>
-              <a:ext uri="{FF2B5EF4-FFF2-40B4-BE49-F238E27FC236}">
-                <a16:creationId xmlns:a16="http://schemas.microsoft.com/office/drawing/2014/main" id="{0C2236F3-61D5-4898-90E4-AFB3DD5808BC}"/>
-              </a:ext>
-            </a:extLst>
-          </p:cNvPr>
+          <p:cNvPr id="7" name="Rectangle 6"/>
           <p:cNvSpPr>
             <a:spLocks noGrp="1" noChangeArrowheads="1"/>
           </p:cNvSpPr>
@@ -1571,21 +1463,21 @@
             <a:pPr>
               <a:defRPr/>
             </a:pPr>
-            <a:fld id="{CDD3DA96-64A7-43C9-B3D0-8F948405ED19}" type="slidenum">
-              <a:rPr lang="en-US" altLang="en-US"/>
+            <a:fld id="{35B5D9FC-B8BB-4202-B459-BBC860423974}" type="slidenum">
+              <a:rPr lang="en-US"/>
               <a:pPr>
                 <a:defRPr/>
               </a:pPr>
               <a:t>‹#›</a:t>
             </a:fld>
-            <a:endParaRPr lang="en-US" altLang="en-US"/>
+            <a:endParaRPr lang="en-US"/>
           </a:p>
         </p:txBody>
       </p:sp>
     </p:spTree>
     <p:extLst>
       <p:ext uri="{BB962C8B-B14F-4D97-AF65-F5344CB8AC3E}">
-        <p14:creationId xmlns:p14="http://schemas.microsoft.com/office/powerpoint/2010/main" val="2062401664"/>
+        <p14:creationId xmlns:p14="http://schemas.microsoft.com/office/powerpoint/2010/main" val="3111563972"/>
       </p:ext>
     </p:extLst>
   </p:cSld>
@@ -1938,13 +1830,7 @@
       </p:sp>
       <p:sp>
         <p:nvSpPr>
-          <p:cNvPr id="7" name="Rectangle 4">
-            <a:extLst>
-              <a:ext uri="{FF2B5EF4-FFF2-40B4-BE49-F238E27FC236}">
-                <a16:creationId xmlns:a16="http://schemas.microsoft.com/office/drawing/2014/main" id="{68ADCC1C-1A79-447B-BA98-38574C58CD13}"/>
-              </a:ext>
-            </a:extLst>
-          </p:cNvPr>
+          <p:cNvPr id="7" name="Rectangle 4"/>
           <p:cNvSpPr>
             <a:spLocks noGrp="1" noChangeArrowheads="1"/>
           </p:cNvSpPr>
@@ -1972,13 +1858,7 @@
       </p:sp>
       <p:sp>
         <p:nvSpPr>
-          <p:cNvPr id="8" name="Rectangle 5">
-            <a:extLst>
-              <a:ext uri="{FF2B5EF4-FFF2-40B4-BE49-F238E27FC236}">
-                <a16:creationId xmlns:a16="http://schemas.microsoft.com/office/drawing/2014/main" id="{E581A194-FE6E-4CEE-A010-AABC7308B86C}"/>
-              </a:ext>
-            </a:extLst>
-          </p:cNvPr>
+          <p:cNvPr id="8" name="Rectangle 5"/>
           <p:cNvSpPr>
             <a:spLocks noGrp="1" noChangeArrowheads="1"/>
           </p:cNvSpPr>
@@ -2006,13 +1886,7 @@
       </p:sp>
       <p:sp>
         <p:nvSpPr>
-          <p:cNvPr id="9" name="Rectangle 6">
-            <a:extLst>
-              <a:ext uri="{FF2B5EF4-FFF2-40B4-BE49-F238E27FC236}">
-                <a16:creationId xmlns:a16="http://schemas.microsoft.com/office/drawing/2014/main" id="{17CC77A7-77A1-4A1C-8123-71B4FB008A94}"/>
-              </a:ext>
-            </a:extLst>
-          </p:cNvPr>
+          <p:cNvPr id="9" name="Rectangle 6"/>
           <p:cNvSpPr>
             <a:spLocks noGrp="1" noChangeArrowheads="1"/>
           </p:cNvSpPr>
@@ -2034,21 +1908,21 @@
             <a:pPr>
               <a:defRPr/>
             </a:pPr>
-            <a:fld id="{E34ADF16-2069-4F1C-93B9-FF80522A5E94}" type="slidenum">
-              <a:rPr lang="en-US" altLang="en-US"/>
+            <a:fld id="{D41EBD0A-7103-47B9-AFD5-4FA330649DC3}" type="slidenum">
+              <a:rPr lang="en-US"/>
               <a:pPr>
                 <a:defRPr/>
               </a:pPr>
               <a:t>‹#›</a:t>
             </a:fld>
-            <a:endParaRPr lang="en-US" altLang="en-US"/>
+            <a:endParaRPr lang="en-US"/>
           </a:p>
         </p:txBody>
       </p:sp>
     </p:spTree>
     <p:extLst>
       <p:ext uri="{BB962C8B-B14F-4D97-AF65-F5344CB8AC3E}">
-        <p14:creationId xmlns:p14="http://schemas.microsoft.com/office/powerpoint/2010/main" val="3727979850"/>
+        <p14:creationId xmlns:p14="http://schemas.microsoft.com/office/powerpoint/2010/main" val="3903279394"/>
       </p:ext>
     </p:extLst>
   </p:cSld>
@@ -2099,13 +1973,7 @@
       </p:sp>
       <p:sp>
         <p:nvSpPr>
-          <p:cNvPr id="3" name="Rectangle 4">
-            <a:extLst>
-              <a:ext uri="{FF2B5EF4-FFF2-40B4-BE49-F238E27FC236}">
-                <a16:creationId xmlns:a16="http://schemas.microsoft.com/office/drawing/2014/main" id="{9F17CCB3-4E7C-452A-BED2-71E3C0313F0C}"/>
-              </a:ext>
-            </a:extLst>
-          </p:cNvPr>
+          <p:cNvPr id="3" name="Rectangle 4"/>
           <p:cNvSpPr>
             <a:spLocks noGrp="1" noChangeArrowheads="1"/>
           </p:cNvSpPr>
@@ -2133,13 +2001,7 @@
       </p:sp>
       <p:sp>
         <p:nvSpPr>
-          <p:cNvPr id="4" name="Rectangle 5">
-            <a:extLst>
-              <a:ext uri="{FF2B5EF4-FFF2-40B4-BE49-F238E27FC236}">
-                <a16:creationId xmlns:a16="http://schemas.microsoft.com/office/drawing/2014/main" id="{7E27C0A6-A874-40AF-BC4B-226F2B5FDB9B}"/>
-              </a:ext>
-            </a:extLst>
-          </p:cNvPr>
+          <p:cNvPr id="4" name="Rectangle 5"/>
           <p:cNvSpPr>
             <a:spLocks noGrp="1" noChangeArrowheads="1"/>
           </p:cNvSpPr>
@@ -2167,13 +2029,7 @@
       </p:sp>
       <p:sp>
         <p:nvSpPr>
-          <p:cNvPr id="5" name="Rectangle 6">
-            <a:extLst>
-              <a:ext uri="{FF2B5EF4-FFF2-40B4-BE49-F238E27FC236}">
-                <a16:creationId xmlns:a16="http://schemas.microsoft.com/office/drawing/2014/main" id="{227488FD-9F08-4C87-BD43-4B0CF4177BE9}"/>
-              </a:ext>
-            </a:extLst>
-          </p:cNvPr>
+          <p:cNvPr id="5" name="Rectangle 6"/>
           <p:cNvSpPr>
             <a:spLocks noGrp="1" noChangeArrowheads="1"/>
           </p:cNvSpPr>
@@ -2195,21 +2051,21 @@
             <a:pPr>
               <a:defRPr/>
             </a:pPr>
-            <a:fld id="{3B4461CE-BDC7-4771-94F7-1D9123A5CA87}" type="slidenum">
-              <a:rPr lang="en-US" altLang="en-US"/>
+            <a:fld id="{6434BBB0-5295-4D4A-85A5-CF30C51AB0B4}" type="slidenum">
+              <a:rPr lang="en-US"/>
               <a:pPr>
                 <a:defRPr/>
               </a:pPr>
               <a:t>‹#›</a:t>
             </a:fld>
-            <a:endParaRPr lang="en-US" altLang="en-US"/>
+            <a:endParaRPr lang="en-US"/>
           </a:p>
         </p:txBody>
       </p:sp>
     </p:spTree>
     <p:extLst>
       <p:ext uri="{BB962C8B-B14F-4D97-AF65-F5344CB8AC3E}">
-        <p14:creationId xmlns:p14="http://schemas.microsoft.com/office/powerpoint/2010/main" val="3798791534"/>
+        <p14:creationId xmlns:p14="http://schemas.microsoft.com/office/powerpoint/2010/main" val="1735183828"/>
       </p:ext>
     </p:extLst>
   </p:cSld>
@@ -2238,13 +2094,7 @@
       </p:grpSpPr>
       <p:sp>
         <p:nvSpPr>
-          <p:cNvPr id="2" name="Rectangle 4">
-            <a:extLst>
-              <a:ext uri="{FF2B5EF4-FFF2-40B4-BE49-F238E27FC236}">
-                <a16:creationId xmlns:a16="http://schemas.microsoft.com/office/drawing/2014/main" id="{C20006EF-7897-421D-AED4-0939A0B69A8C}"/>
-              </a:ext>
-            </a:extLst>
-          </p:cNvPr>
+          <p:cNvPr id="2" name="Rectangle 4"/>
           <p:cNvSpPr>
             <a:spLocks noGrp="1" noChangeArrowheads="1"/>
           </p:cNvSpPr>
@@ -2272,13 +2122,7 @@
       </p:sp>
       <p:sp>
         <p:nvSpPr>
-          <p:cNvPr id="3" name="Rectangle 5">
-            <a:extLst>
-              <a:ext uri="{FF2B5EF4-FFF2-40B4-BE49-F238E27FC236}">
-                <a16:creationId xmlns:a16="http://schemas.microsoft.com/office/drawing/2014/main" id="{84C0E489-837B-447F-B2C4-3B7D73F3147B}"/>
-              </a:ext>
-            </a:extLst>
-          </p:cNvPr>
+          <p:cNvPr id="3" name="Rectangle 5"/>
           <p:cNvSpPr>
             <a:spLocks noGrp="1" noChangeArrowheads="1"/>
           </p:cNvSpPr>
@@ -2306,13 +2150,7 @@
       </p:sp>
       <p:sp>
         <p:nvSpPr>
-          <p:cNvPr id="4" name="Rectangle 6">
-            <a:extLst>
-              <a:ext uri="{FF2B5EF4-FFF2-40B4-BE49-F238E27FC236}">
-                <a16:creationId xmlns:a16="http://schemas.microsoft.com/office/drawing/2014/main" id="{A70A0ACF-B1FC-4ED6-9EA0-BF665B79A7BA}"/>
-              </a:ext>
-            </a:extLst>
-          </p:cNvPr>
+          <p:cNvPr id="4" name="Rectangle 6"/>
           <p:cNvSpPr>
             <a:spLocks noGrp="1" noChangeArrowheads="1"/>
           </p:cNvSpPr>
@@ -2334,21 +2172,21 @@
             <a:pPr>
               <a:defRPr/>
             </a:pPr>
-            <a:fld id="{3C7C39D0-F348-433F-B25D-C5FBC38C0254}" type="slidenum">
-              <a:rPr lang="en-US" altLang="en-US"/>
+            <a:fld id="{5CF1D9A6-9855-434B-B349-5EA445C9E6B7}" type="slidenum">
+              <a:rPr lang="en-US"/>
               <a:pPr>
                 <a:defRPr/>
               </a:pPr>
               <a:t>‹#›</a:t>
             </a:fld>
-            <a:endParaRPr lang="en-US" altLang="en-US"/>
+            <a:endParaRPr lang="en-US"/>
           </a:p>
         </p:txBody>
       </p:sp>
     </p:spTree>
     <p:extLst>
       <p:ext uri="{BB962C8B-B14F-4D97-AF65-F5344CB8AC3E}">
-        <p14:creationId xmlns:p14="http://schemas.microsoft.com/office/powerpoint/2010/main" val="1197345585"/>
+        <p14:creationId xmlns:p14="http://schemas.microsoft.com/office/powerpoint/2010/main" val="436125627"/>
       </p:ext>
     </p:extLst>
   </p:cSld>
@@ -2557,13 +2395,7 @@
       </p:sp>
       <p:sp>
         <p:nvSpPr>
-          <p:cNvPr id="5" name="Rectangle 4">
-            <a:extLst>
-              <a:ext uri="{FF2B5EF4-FFF2-40B4-BE49-F238E27FC236}">
-                <a16:creationId xmlns:a16="http://schemas.microsoft.com/office/drawing/2014/main" id="{66B734AC-1A70-4247-9941-3E17F86AF582}"/>
-              </a:ext>
-            </a:extLst>
-          </p:cNvPr>
+          <p:cNvPr id="5" name="Rectangle 4"/>
           <p:cNvSpPr>
             <a:spLocks noGrp="1" noChangeArrowheads="1"/>
           </p:cNvSpPr>
@@ -2591,13 +2423,7 @@
       </p:sp>
       <p:sp>
         <p:nvSpPr>
-          <p:cNvPr id="6" name="Rectangle 5">
-            <a:extLst>
-              <a:ext uri="{FF2B5EF4-FFF2-40B4-BE49-F238E27FC236}">
-                <a16:creationId xmlns:a16="http://schemas.microsoft.com/office/drawing/2014/main" id="{7F3D43D6-98BE-4792-8E41-61480D812A2C}"/>
-              </a:ext>
-            </a:extLst>
-          </p:cNvPr>
+          <p:cNvPr id="6" name="Rectangle 5"/>
           <p:cNvSpPr>
             <a:spLocks noGrp="1" noChangeArrowheads="1"/>
           </p:cNvSpPr>
@@ -2625,13 +2451,7 @@
       </p:sp>
       <p:sp>
         <p:nvSpPr>
-          <p:cNvPr id="7" name="Rectangle 6">
-            <a:extLst>
-              <a:ext uri="{FF2B5EF4-FFF2-40B4-BE49-F238E27FC236}">
-                <a16:creationId xmlns:a16="http://schemas.microsoft.com/office/drawing/2014/main" id="{03080AE3-3D52-4795-B368-BE3C946DC5B6}"/>
-              </a:ext>
-            </a:extLst>
-          </p:cNvPr>
+          <p:cNvPr id="7" name="Rectangle 6"/>
           <p:cNvSpPr>
             <a:spLocks noGrp="1" noChangeArrowheads="1"/>
           </p:cNvSpPr>
@@ -2653,21 +2473,21 @@
             <a:pPr>
               <a:defRPr/>
             </a:pPr>
-            <a:fld id="{8258B667-F331-4677-8B3F-12B8EBE30535}" type="slidenum">
-              <a:rPr lang="en-US" altLang="en-US"/>
+            <a:fld id="{8E1C6C0B-CD7F-4BAA-8E65-641E43A9846F}" type="slidenum">
+              <a:rPr lang="en-US"/>
               <a:pPr>
                 <a:defRPr/>
               </a:pPr>
               <a:t>‹#›</a:t>
             </a:fld>
-            <a:endParaRPr lang="en-US" altLang="en-US"/>
+            <a:endParaRPr lang="en-US"/>
           </a:p>
         </p:txBody>
       </p:sp>
     </p:spTree>
     <p:extLst>
       <p:ext uri="{BB962C8B-B14F-4D97-AF65-F5344CB8AC3E}">
-        <p14:creationId xmlns:p14="http://schemas.microsoft.com/office/powerpoint/2010/main" val="3734018296"/>
+        <p14:creationId xmlns:p14="http://schemas.microsoft.com/office/powerpoint/2010/main" val="2189824764"/>
       </p:ext>
     </p:extLst>
   </p:cSld>
@@ -2783,7 +2603,10 @@
           </a:lstStyle>
           <a:p>
             <a:pPr lvl="0"/>
-            <a:endParaRPr lang="en-US" noProof="0"/>
+            <a:r>
+              <a:rPr lang="en-US" noProof="0"/>
+              <a:t>Click icon to add picture</a:t>
+            </a:r>
           </a:p>
         </p:txBody>
       </p:sp>
@@ -2854,13 +2677,7 @@
       </p:sp>
       <p:sp>
         <p:nvSpPr>
-          <p:cNvPr id="5" name="Rectangle 4">
-            <a:extLst>
-              <a:ext uri="{FF2B5EF4-FFF2-40B4-BE49-F238E27FC236}">
-                <a16:creationId xmlns:a16="http://schemas.microsoft.com/office/drawing/2014/main" id="{01D279C5-059C-4E50-ACBD-FE76FC16BEC4}"/>
-              </a:ext>
-            </a:extLst>
-          </p:cNvPr>
+          <p:cNvPr id="5" name="Rectangle 4"/>
           <p:cNvSpPr>
             <a:spLocks noGrp="1" noChangeArrowheads="1"/>
           </p:cNvSpPr>
@@ -2888,13 +2705,7 @@
       </p:sp>
       <p:sp>
         <p:nvSpPr>
-          <p:cNvPr id="6" name="Rectangle 5">
-            <a:extLst>
-              <a:ext uri="{FF2B5EF4-FFF2-40B4-BE49-F238E27FC236}">
-                <a16:creationId xmlns:a16="http://schemas.microsoft.com/office/drawing/2014/main" id="{4546DDBE-80D2-44C3-8ED2-9EE74F873994}"/>
-              </a:ext>
-            </a:extLst>
-          </p:cNvPr>
+          <p:cNvPr id="6" name="Rectangle 5"/>
           <p:cNvSpPr>
             <a:spLocks noGrp="1" noChangeArrowheads="1"/>
           </p:cNvSpPr>
@@ -2922,13 +2733,7 @@
       </p:sp>
       <p:sp>
         <p:nvSpPr>
-          <p:cNvPr id="7" name="Rectangle 6">
-            <a:extLst>
-              <a:ext uri="{FF2B5EF4-FFF2-40B4-BE49-F238E27FC236}">
-                <a16:creationId xmlns:a16="http://schemas.microsoft.com/office/drawing/2014/main" id="{0B147C52-B118-4DFC-B3B0-67E15441F783}"/>
-              </a:ext>
-            </a:extLst>
-          </p:cNvPr>
+          <p:cNvPr id="7" name="Rectangle 6"/>
           <p:cNvSpPr>
             <a:spLocks noGrp="1" noChangeArrowheads="1"/>
           </p:cNvSpPr>
@@ -2950,21 +2755,21 @@
             <a:pPr>
               <a:defRPr/>
             </a:pPr>
-            <a:fld id="{463909A4-EBDC-454C-A709-7E83AE3FCD0E}" type="slidenum">
-              <a:rPr lang="en-US" altLang="en-US"/>
+            <a:fld id="{D410B056-E179-4B04-89E7-89E45B194D24}" type="slidenum">
+              <a:rPr lang="en-US"/>
               <a:pPr>
                 <a:defRPr/>
               </a:pPr>
               <a:t>‹#›</a:t>
             </a:fld>
-            <a:endParaRPr lang="en-US" altLang="en-US"/>
+            <a:endParaRPr lang="en-US"/>
           </a:p>
         </p:txBody>
       </p:sp>
     </p:spTree>
     <p:extLst>
       <p:ext uri="{BB962C8B-B14F-4D97-AF65-F5344CB8AC3E}">
-        <p14:creationId xmlns:p14="http://schemas.microsoft.com/office/powerpoint/2010/main" val="1348553825"/>
+        <p14:creationId xmlns:p14="http://schemas.microsoft.com/office/powerpoint/2010/main" val="2893995398"/>
       </p:ext>
     </p:extLst>
   </p:cSld>
@@ -3001,13 +2806,7 @@
       </p:grpSpPr>
       <p:sp>
         <p:nvSpPr>
-          <p:cNvPr id="1026" name="Rectangle 2">
-            <a:extLst>
-              <a:ext uri="{FF2B5EF4-FFF2-40B4-BE49-F238E27FC236}">
-                <a16:creationId xmlns:a16="http://schemas.microsoft.com/office/drawing/2014/main" id="{4BA77614-2E62-4E6C-AAFC-E6367E912701}"/>
-              </a:ext>
-            </a:extLst>
-          </p:cNvPr>
+          <p:cNvPr id="1026" name="Rectangle 2"/>
           <p:cNvSpPr>
             <a:spLocks noGrp="1" noChangeArrowheads="1"/>
           </p:cNvSpPr>
@@ -3017,7 +2816,7 @@
         </p:nvSpPr>
         <p:spPr bwMode="auto">
           <a:xfrm>
-            <a:off x="457200" y="228600"/>
+            <a:off x="457200" y="228865"/>
             <a:ext cx="8229600" cy="952500"/>
           </a:xfrm>
           <a:prstGeom prst="rect">
@@ -3027,34 +2826,24 @@
           <a:ln>
             <a:noFill/>
           </a:ln>
-          <a:effectLst/>
           <a:extLst>
             <a:ext uri="{909E8E84-426E-40DD-AFC4-6F175D3DCCD1}">
               <a14:hiddenFill xmlns:a14="http://schemas.microsoft.com/office/drawing/2010/main">
                 <a:solidFill>
-                  <a:schemeClr val="accent1"/>
+                  <a:srgbClr val="FFFFFF"/>
                 </a:solidFill>
               </a14:hiddenFill>
             </a:ext>
             <a:ext uri="{91240B29-F687-4F45-9708-019B960494DF}">
               <a14:hiddenLine xmlns:a14="http://schemas.microsoft.com/office/drawing/2010/main" w="9525">
                 <a:solidFill>
-                  <a:schemeClr val="tx1"/>
+                  <a:srgbClr val="000000"/>
                 </a:solidFill>
                 <a:miter lim="800000"/>
                 <a:headEnd/>
                 <a:tailEnd/>
               </a14:hiddenLine>
             </a:ext>
-            <a:ext uri="{AF507438-7753-43E0-B8FC-AC1667EBCBE1}">
-              <a14:hiddenEffects xmlns:a14="http://schemas.microsoft.com/office/drawing/2010/main">
-                <a:effectLst>
-                  <a:outerShdw dist="35921" dir="2700000" algn="ctr" rotWithShape="0">
-                    <a:schemeClr val="bg2"/>
-                  </a:outerShdw>
-                </a:effectLst>
-              </a14:hiddenEffects>
-            </a:ext>
           </a:extLst>
         </p:spPr>
         <p:txBody>
@@ -3067,7 +2856,7 @@
           <a:p>
             <a:pPr lvl="0"/>
             <a:r>
-              <a:rPr lang="en-US" altLang="en-US"/>
+              <a:rPr lang="en-US"/>
               <a:t>Click to edit Master title style</a:t>
             </a:r>
           </a:p>
@@ -3075,13 +2864,7 @@
       </p:sp>
       <p:sp>
         <p:nvSpPr>
-          <p:cNvPr id="1027" name="Rectangle 3">
-            <a:extLst>
-              <a:ext uri="{FF2B5EF4-FFF2-40B4-BE49-F238E27FC236}">
-                <a16:creationId xmlns:a16="http://schemas.microsoft.com/office/drawing/2014/main" id="{875C6DEB-3CEE-4A7F-8220-0B67B18FBC0B}"/>
-              </a:ext>
-            </a:extLst>
-          </p:cNvPr>
+          <p:cNvPr id="1027" name="Rectangle 3"/>
           <p:cNvSpPr>
             <a:spLocks noGrp="1" noChangeArrowheads="1"/>
           </p:cNvSpPr>
@@ -3091,8 +2874,8 @@
         </p:nvSpPr>
         <p:spPr bwMode="auto">
           <a:xfrm>
-            <a:off x="457200" y="1333500"/>
-            <a:ext cx="8229600" cy="3771900"/>
+            <a:off x="457200" y="1333501"/>
+            <a:ext cx="8229600" cy="3771636"/>
           </a:xfrm>
           <a:prstGeom prst="rect">
             <a:avLst/>
@@ -3101,34 +2884,24 @@
           <a:ln>
             <a:noFill/>
           </a:ln>
-          <a:effectLst/>
           <a:extLst>
             <a:ext uri="{909E8E84-426E-40DD-AFC4-6F175D3DCCD1}">
               <a14:hiddenFill xmlns:a14="http://schemas.microsoft.com/office/drawing/2010/main">
                 <a:solidFill>
-                  <a:schemeClr val="accent1"/>
+                  <a:srgbClr val="FFFFFF"/>
                 </a:solidFill>
               </a14:hiddenFill>
             </a:ext>
             <a:ext uri="{91240B29-F687-4F45-9708-019B960494DF}">
               <a14:hiddenLine xmlns:a14="http://schemas.microsoft.com/office/drawing/2010/main" w="9525">
                 <a:solidFill>
-                  <a:schemeClr val="tx1"/>
+                  <a:srgbClr val="000000"/>
                 </a:solidFill>
                 <a:miter lim="800000"/>
                 <a:headEnd/>
                 <a:tailEnd/>
               </a14:hiddenLine>
             </a:ext>
-            <a:ext uri="{AF507438-7753-43E0-B8FC-AC1667EBCBE1}">
-              <a14:hiddenEffects xmlns:a14="http://schemas.microsoft.com/office/drawing/2010/main">
-                <a:effectLst>
-                  <a:outerShdw dist="35921" dir="2700000" algn="ctr" rotWithShape="0">
-                    <a:schemeClr val="bg2"/>
-                  </a:outerShdw>
-                </a:effectLst>
-              </a14:hiddenEffects>
-            </a:ext>
           </a:extLst>
         </p:spPr>
         <p:txBody>
@@ -3141,35 +2914,35 @@
           <a:p>
             <a:pPr lvl="0"/>
             <a:r>
-              <a:rPr lang="en-US" altLang="en-US"/>
+              <a:rPr lang="en-US"/>
               <a:t>Click to edit Master text styles</a:t>
             </a:r>
           </a:p>
           <a:p>
             <a:pPr lvl="1"/>
             <a:r>
-              <a:rPr lang="en-US" altLang="en-US"/>
+              <a:rPr lang="en-US"/>
               <a:t>Second level</a:t>
             </a:r>
           </a:p>
           <a:p>
             <a:pPr lvl="2"/>
             <a:r>
-              <a:rPr lang="en-US" altLang="en-US"/>
+              <a:rPr lang="en-US"/>
               <a:t>Third level</a:t>
             </a:r>
           </a:p>
           <a:p>
             <a:pPr lvl="3"/>
             <a:r>
-              <a:rPr lang="en-US" altLang="en-US"/>
+              <a:rPr lang="en-US"/>
               <a:t>Fourth level</a:t>
             </a:r>
           </a:p>
           <a:p>
             <a:pPr lvl="4"/>
             <a:r>
-              <a:rPr lang="en-US" altLang="en-US"/>
+              <a:rPr lang="en-US"/>
               <a:t>Fifth level</a:t>
             </a:r>
           </a:p>
@@ -3177,13 +2950,7 @@
       </p:sp>
       <p:sp>
         <p:nvSpPr>
-          <p:cNvPr id="1028" name="Rectangle 4">
-            <a:extLst>
-              <a:ext uri="{FF2B5EF4-FFF2-40B4-BE49-F238E27FC236}">
-                <a16:creationId xmlns:a16="http://schemas.microsoft.com/office/drawing/2014/main" id="{EA47E85E-5F4D-40D7-8026-6128F3F6EB7A}"/>
-              </a:ext>
-            </a:extLst>
-          </p:cNvPr>
+          <p:cNvPr id="1028" name="Rectangle 4"/>
           <p:cNvSpPr>
             <a:spLocks noGrp="1" noChangeArrowheads="1"/>
           </p:cNvSpPr>
@@ -3193,45 +2960,20 @@
         </p:nvSpPr>
         <p:spPr bwMode="auto">
           <a:xfrm>
-            <a:off x="457200" y="5203825"/>
+            <a:off x="457200" y="5204354"/>
             <a:ext cx="2133600" cy="396875"/>
           </a:xfrm>
           <a:prstGeom prst="rect">
             <a:avLst/>
           </a:prstGeom>
           <a:noFill/>
-          <a:ln>
+          <a:ln w="9525">
             <a:noFill/>
+            <a:miter lim="800000"/>
+            <a:headEnd/>
+            <a:tailEnd/>
           </a:ln>
           <a:effectLst/>
-          <a:extLst>
-            <a:ext uri="{909E8E84-426E-40DD-AFC4-6F175D3DCCD1}">
-              <a14:hiddenFill xmlns:a14="http://schemas.microsoft.com/office/drawing/2010/main">
-                <a:solidFill>
-                  <a:schemeClr val="accent1"/>
-                </a:solidFill>
-              </a14:hiddenFill>
-            </a:ext>
-            <a:ext uri="{91240B29-F687-4F45-9708-019B960494DF}">
-              <a14:hiddenLine xmlns:a14="http://schemas.microsoft.com/office/drawing/2010/main" w="9525">
-                <a:solidFill>
-                  <a:schemeClr val="tx1"/>
-                </a:solidFill>
-                <a:miter lim="800000"/>
-                <a:headEnd/>
-                <a:tailEnd/>
-              </a14:hiddenLine>
-            </a:ext>
-            <a:ext uri="{AF507438-7753-43E0-B8FC-AC1667EBCBE1}">
-              <a14:hiddenEffects xmlns:a14="http://schemas.microsoft.com/office/drawing/2010/main">
-                <a:effectLst>
-                  <a:outerShdw dist="35921" dir="2700000" algn="ctr" rotWithShape="0">
-                    <a:schemeClr val="bg2"/>
-                  </a:outerShdw>
-                </a:effectLst>
-              </a14:hiddenEffects>
-            </a:ext>
-          </a:extLst>
         </p:spPr>
         <p:txBody>
           <a:bodyPr vert="horz" wrap="square" lIns="91440" tIns="45720" rIns="91440" bIns="45720" numCol="1" anchor="t" anchorCtr="0" compatLnSpc="1">
@@ -3240,10 +2982,8 @@
             </a:prstTxWarp>
           </a:bodyPr>
           <a:lstStyle>
-            <a:lvl1pPr algn="l" eaLnBrk="1" hangingPunct="1">
-              <a:defRPr sz="1050" b="0">
-                <a:latin typeface="Arial" charset="0"/>
-              </a:defRPr>
+            <a:lvl1pPr>
+              <a:defRPr smtClean="0"/>
             </a:lvl1pPr>
           </a:lstStyle>
           <a:p>
@@ -3256,13 +2996,7 @@
       </p:sp>
       <p:sp>
         <p:nvSpPr>
-          <p:cNvPr id="1029" name="Rectangle 5">
-            <a:extLst>
-              <a:ext uri="{FF2B5EF4-FFF2-40B4-BE49-F238E27FC236}">
-                <a16:creationId xmlns:a16="http://schemas.microsoft.com/office/drawing/2014/main" id="{AFEC718A-4049-45DE-8DA6-B672B6A46FAE}"/>
-              </a:ext>
-            </a:extLst>
-          </p:cNvPr>
+          <p:cNvPr id="1029" name="Rectangle 5"/>
           <p:cNvSpPr>
             <a:spLocks noGrp="1" noChangeArrowheads="1"/>
           </p:cNvSpPr>
@@ -3272,45 +3006,20 @@
         </p:nvSpPr>
         <p:spPr bwMode="auto">
           <a:xfrm>
-            <a:off x="3124200" y="5203825"/>
+            <a:off x="3124200" y="5204354"/>
             <a:ext cx="2895600" cy="396875"/>
           </a:xfrm>
           <a:prstGeom prst="rect">
             <a:avLst/>
           </a:prstGeom>
           <a:noFill/>
-          <a:ln>
+          <a:ln w="9525">
             <a:noFill/>
+            <a:miter lim="800000"/>
+            <a:headEnd/>
+            <a:tailEnd/>
           </a:ln>
           <a:effectLst/>
-          <a:extLst>
-            <a:ext uri="{909E8E84-426E-40DD-AFC4-6F175D3DCCD1}">
-              <a14:hiddenFill xmlns:a14="http://schemas.microsoft.com/office/drawing/2010/main">
-                <a:solidFill>
-                  <a:schemeClr val="accent1"/>
-                </a:solidFill>
-              </a14:hiddenFill>
-            </a:ext>
-            <a:ext uri="{91240B29-F687-4F45-9708-019B960494DF}">
-              <a14:hiddenLine xmlns:a14="http://schemas.microsoft.com/office/drawing/2010/main" w="9525">
-                <a:solidFill>
-                  <a:schemeClr val="tx1"/>
-                </a:solidFill>
-                <a:miter lim="800000"/>
-                <a:headEnd/>
-                <a:tailEnd/>
-              </a14:hiddenLine>
-            </a:ext>
-            <a:ext uri="{AF507438-7753-43E0-B8FC-AC1667EBCBE1}">
-              <a14:hiddenEffects xmlns:a14="http://schemas.microsoft.com/office/drawing/2010/main">
-                <a:effectLst>
-                  <a:outerShdw dist="35921" dir="2700000" algn="ctr" rotWithShape="0">
-                    <a:schemeClr val="bg2"/>
-                  </a:outerShdw>
-                </a:effectLst>
-              </a14:hiddenEffects>
-            </a:ext>
-          </a:extLst>
         </p:spPr>
         <p:txBody>
           <a:bodyPr vert="horz" wrap="square" lIns="91440" tIns="45720" rIns="91440" bIns="45720" numCol="1" anchor="t" anchorCtr="0" compatLnSpc="1">
@@ -3319,10 +3028,8 @@
             </a:prstTxWarp>
           </a:bodyPr>
           <a:lstStyle>
-            <a:lvl1pPr algn="ctr" eaLnBrk="1" hangingPunct="1">
-              <a:defRPr sz="1050" b="0">
-                <a:latin typeface="Arial" charset="0"/>
-              </a:defRPr>
+            <a:lvl1pPr algn="ctr">
+              <a:defRPr smtClean="0"/>
             </a:lvl1pPr>
           </a:lstStyle>
           <a:p>
@@ -3335,13 +3042,7 @@
       </p:sp>
       <p:sp>
         <p:nvSpPr>
-          <p:cNvPr id="1030" name="Rectangle 6">
-            <a:extLst>
-              <a:ext uri="{FF2B5EF4-FFF2-40B4-BE49-F238E27FC236}">
-                <a16:creationId xmlns:a16="http://schemas.microsoft.com/office/drawing/2014/main" id="{4D4D9333-C407-4D8C-8630-CC6BCB5DFEE0}"/>
-              </a:ext>
-            </a:extLst>
-          </p:cNvPr>
+          <p:cNvPr id="1030" name="Rectangle 6"/>
           <p:cNvSpPr>
             <a:spLocks noGrp="1" noChangeArrowheads="1"/>
           </p:cNvSpPr>
@@ -3351,45 +3052,20 @@
         </p:nvSpPr>
         <p:spPr bwMode="auto">
           <a:xfrm>
-            <a:off x="6553200" y="5203825"/>
+            <a:off x="6553200" y="5204354"/>
             <a:ext cx="2133600" cy="396875"/>
           </a:xfrm>
           <a:prstGeom prst="rect">
             <a:avLst/>
           </a:prstGeom>
           <a:noFill/>
-          <a:ln>
+          <a:ln w="9525">
             <a:noFill/>
+            <a:miter lim="800000"/>
+            <a:headEnd/>
+            <a:tailEnd/>
           </a:ln>
           <a:effectLst/>
-          <a:extLst>
-            <a:ext uri="{909E8E84-426E-40DD-AFC4-6F175D3DCCD1}">
-              <a14:hiddenFill xmlns:a14="http://schemas.microsoft.com/office/drawing/2010/main">
-                <a:solidFill>
-                  <a:schemeClr val="accent1"/>
-                </a:solidFill>
-              </a14:hiddenFill>
-            </a:ext>
-            <a:ext uri="{91240B29-F687-4F45-9708-019B960494DF}">
-              <a14:hiddenLine xmlns:a14="http://schemas.microsoft.com/office/drawing/2010/main" w="9525">
-                <a:solidFill>
-                  <a:schemeClr val="tx1"/>
-                </a:solidFill>
-                <a:miter lim="800000"/>
-                <a:headEnd/>
-                <a:tailEnd/>
-              </a14:hiddenLine>
-            </a:ext>
-            <a:ext uri="{AF507438-7753-43E0-B8FC-AC1667EBCBE1}">
-              <a14:hiddenEffects xmlns:a14="http://schemas.microsoft.com/office/drawing/2010/main">
-                <a:effectLst>
-                  <a:outerShdw dist="35921" dir="2700000" algn="ctr" rotWithShape="0">
-                    <a:schemeClr val="bg2"/>
-                  </a:outerShdw>
-                </a:effectLst>
-              </a14:hiddenEffects>
-            </a:ext>
-          </a:extLst>
         </p:spPr>
         <p:txBody>
           <a:bodyPr vert="horz" wrap="square" lIns="91440" tIns="45720" rIns="91440" bIns="45720" numCol="1" anchor="t" anchorCtr="0" compatLnSpc="1">
@@ -3398,22 +3074,22 @@
             </a:prstTxWarp>
           </a:bodyPr>
           <a:lstStyle>
-            <a:lvl1pPr algn="r" eaLnBrk="1" hangingPunct="1">
-              <a:defRPr sz="1050" b="0"/>
+            <a:lvl1pPr algn="r">
+              <a:defRPr smtClean="0"/>
             </a:lvl1pPr>
           </a:lstStyle>
           <a:p>
             <a:pPr>
               <a:defRPr/>
             </a:pPr>
-            <a:fld id="{26F712FF-748E-4519-B9C3-6253CC0B6FF3}" type="slidenum">
-              <a:rPr lang="en-US" altLang="en-US"/>
+            <a:fld id="{69C1D95B-8256-482D-9584-FA69AE9FD78D}" type="slidenum">
+              <a:rPr lang="en-US"/>
               <a:pPr>
                 <a:defRPr/>
               </a:pPr>
               <a:t>‹#›</a:t>
             </a:fld>
-            <a:endParaRPr lang="en-US" altLang="en-US"/>
+            <a:endParaRPr lang="en-US"/>
           </a:p>
         </p:txBody>
       </p:sp>
@@ -3435,7 +3111,7 @@
   </p:sldLayoutIdLst>
   <p:txStyles>
     <p:titleStyle>
-      <a:lvl1pPr algn="ctr" rtl="0" eaLnBrk="0" fontAlgn="base" hangingPunct="0">
+      <a:lvl1pPr algn="ctr" rtl="0" eaLnBrk="1" fontAlgn="base" hangingPunct="1">
         <a:spcBef>
           <a:spcPct val="0"/>
         </a:spcBef>
@@ -3451,7 +3127,7 @@
           <a:cs typeface="+mj-cs"/>
         </a:defRPr>
       </a:lvl1pPr>
-      <a:lvl2pPr algn="ctr" rtl="0" eaLnBrk="0" fontAlgn="base" hangingPunct="0">
+      <a:lvl2pPr algn="ctr" rtl="0" eaLnBrk="1" fontAlgn="base" hangingPunct="1">
         <a:spcBef>
           <a:spcPct val="0"/>
         </a:spcBef>
@@ -3465,7 +3141,7 @@
           <a:latin typeface="Arial" charset="0"/>
         </a:defRPr>
       </a:lvl2pPr>
-      <a:lvl3pPr algn="ctr" rtl="0" eaLnBrk="0" fontAlgn="base" hangingPunct="0">
+      <a:lvl3pPr algn="ctr" rtl="0" eaLnBrk="1" fontAlgn="base" hangingPunct="1">
         <a:spcBef>
           <a:spcPct val="0"/>
         </a:spcBef>
@@ -3479,7 +3155,7 @@
           <a:latin typeface="Arial" charset="0"/>
         </a:defRPr>
       </a:lvl3pPr>
-      <a:lvl4pPr algn="ctr" rtl="0" eaLnBrk="0" fontAlgn="base" hangingPunct="0">
+      <a:lvl4pPr algn="ctr" rtl="0" eaLnBrk="1" fontAlgn="base" hangingPunct="1">
         <a:spcBef>
           <a:spcPct val="0"/>
         </a:spcBef>
@@ -3493,7 +3169,7 @@
           <a:latin typeface="Arial" charset="0"/>
         </a:defRPr>
       </a:lvl4pPr>
-      <a:lvl5pPr algn="ctr" rtl="0" eaLnBrk="0" fontAlgn="base" hangingPunct="0">
+      <a:lvl5pPr algn="ctr" rtl="0" eaLnBrk="1" fontAlgn="base" hangingPunct="1">
         <a:spcBef>
           <a:spcPct val="0"/>
         </a:spcBef>
@@ -3507,7 +3183,7 @@
           <a:latin typeface="Arial" charset="0"/>
         </a:defRPr>
       </a:lvl5pPr>
-      <a:lvl6pPr marL="342900" algn="ctr" rtl="0" fontAlgn="base">
+      <a:lvl6pPr marL="342900" algn="ctr" rtl="0" eaLnBrk="1" fontAlgn="base" hangingPunct="1">
         <a:spcBef>
           <a:spcPct val="0"/>
         </a:spcBef>
@@ -3521,7 +3197,7 @@
           <a:latin typeface="Arial" charset="0"/>
         </a:defRPr>
       </a:lvl6pPr>
-      <a:lvl7pPr marL="685800" algn="ctr" rtl="0" fontAlgn="base">
+      <a:lvl7pPr marL="685800" algn="ctr" rtl="0" eaLnBrk="1" fontAlgn="base" hangingPunct="1">
         <a:spcBef>
           <a:spcPct val="0"/>
         </a:spcBef>
@@ -3535,7 +3211,7 @@
           <a:latin typeface="Arial" charset="0"/>
         </a:defRPr>
       </a:lvl7pPr>
-      <a:lvl8pPr marL="1028700" algn="ctr" rtl="0" fontAlgn="base">
+      <a:lvl8pPr marL="1028700" algn="ctr" rtl="0" eaLnBrk="1" fontAlgn="base" hangingPunct="1">
         <a:spcBef>
           <a:spcPct val="0"/>
         </a:spcBef>
@@ -3549,7 +3225,7 @@
           <a:latin typeface="Arial" charset="0"/>
         </a:defRPr>
       </a:lvl8pPr>
-      <a:lvl9pPr marL="1371600" algn="ctr" rtl="0" fontAlgn="base">
+      <a:lvl9pPr marL="1371600" algn="ctr" rtl="0" eaLnBrk="1" fontAlgn="base" hangingPunct="1">
         <a:spcBef>
           <a:spcPct val="0"/>
         </a:spcBef>
@@ -3565,7 +3241,7 @@
       </a:lvl9pPr>
     </p:titleStyle>
     <p:bodyStyle>
-      <a:lvl1pPr marL="257175" indent="-257175" algn="l" rtl="0" eaLnBrk="0" fontAlgn="base" hangingPunct="0">
+      <a:lvl1pPr marL="257175" indent="-257175" algn="l" rtl="0" eaLnBrk="1" fontAlgn="base" hangingPunct="1">
         <a:spcBef>
           <a:spcPct val="20000"/>
         </a:spcBef>
@@ -3582,7 +3258,7 @@
           <a:cs typeface="+mn-cs"/>
         </a:defRPr>
       </a:lvl1pPr>
-      <a:lvl2pPr marL="557213" indent="-214313" algn="l" rtl="0" eaLnBrk="0" fontAlgn="base" hangingPunct="0">
+      <a:lvl2pPr marL="557213" indent="-214313" algn="l" rtl="0" eaLnBrk="1" fontAlgn="base" hangingPunct="1">
         <a:spcBef>
           <a:spcPct val="20000"/>
         </a:spcBef>
@@ -3597,7 +3273,7 @@
           <a:latin typeface="+mn-lt"/>
         </a:defRPr>
       </a:lvl2pPr>
-      <a:lvl3pPr marL="857250" indent="-171450" algn="l" rtl="0" eaLnBrk="0" fontAlgn="base" hangingPunct="0">
+      <a:lvl3pPr marL="857250" indent="-171450" algn="l" rtl="0" eaLnBrk="1" fontAlgn="base" hangingPunct="1">
         <a:spcBef>
           <a:spcPct val="20000"/>
         </a:spcBef>
@@ -3605,14 +3281,14 @@
           <a:spcPct val="0"/>
         </a:spcAft>
         <a:buChar char="•"/>
-        <a:defRPr>
+        <a:defRPr sz="1800">
           <a:solidFill>
             <a:schemeClr val="tx1"/>
           </a:solidFill>
           <a:latin typeface="+mn-lt"/>
         </a:defRPr>
       </a:lvl3pPr>
-      <a:lvl4pPr marL="1200150" indent="-171450" algn="l" rtl="0" eaLnBrk="0" fontAlgn="base" hangingPunct="0">
+      <a:lvl4pPr marL="1200150" indent="-171450" algn="l" rtl="0" eaLnBrk="1" fontAlgn="base" hangingPunct="1">
         <a:spcBef>
           <a:spcPct val="20000"/>
         </a:spcBef>
@@ -3627,7 +3303,7 @@
           <a:latin typeface="+mn-lt"/>
         </a:defRPr>
       </a:lvl4pPr>
-      <a:lvl5pPr marL="1543050" indent="-171450" algn="l" rtl="0" eaLnBrk="0" fontAlgn="base" hangingPunct="0">
+      <a:lvl5pPr marL="1543050" indent="-171450" algn="l" rtl="0" eaLnBrk="1" fontAlgn="base" hangingPunct="1">
         <a:spcBef>
           <a:spcPct val="20000"/>
         </a:spcBef>
@@ -3642,7 +3318,7 @@
           <a:latin typeface="+mn-lt"/>
         </a:defRPr>
       </a:lvl5pPr>
-      <a:lvl6pPr marL="1885950" indent="-171450" algn="l" rtl="0" fontAlgn="base">
+      <a:lvl6pPr marL="1885950" indent="-171450" algn="l" rtl="0" eaLnBrk="1" fontAlgn="base" hangingPunct="1">
         <a:spcBef>
           <a:spcPct val="20000"/>
         </a:spcBef>
@@ -3657,7 +3333,7 @@
           <a:latin typeface="+mn-lt"/>
         </a:defRPr>
       </a:lvl6pPr>
-      <a:lvl7pPr marL="2228850" indent="-171450" algn="l" rtl="0" fontAlgn="base">
+      <a:lvl7pPr marL="2228850" indent="-171450" algn="l" rtl="0" eaLnBrk="1" fontAlgn="base" hangingPunct="1">
         <a:spcBef>
           <a:spcPct val="20000"/>
         </a:spcBef>
@@ -3672,7 +3348,7 @@
           <a:latin typeface="+mn-lt"/>
         </a:defRPr>
       </a:lvl7pPr>
-      <a:lvl8pPr marL="2571750" indent="-171450" algn="l" rtl="0" fontAlgn="base">
+      <a:lvl8pPr marL="2571750" indent="-171450" algn="l" rtl="0" eaLnBrk="1" fontAlgn="base" hangingPunct="1">
         <a:spcBef>
           <a:spcPct val="20000"/>
         </a:spcBef>
@@ -3687,7 +3363,7 @@
           <a:latin typeface="+mn-lt"/>
         </a:defRPr>
       </a:lvl8pPr>
-      <a:lvl9pPr marL="2914650" indent="-171450" algn="l" rtl="0" fontAlgn="base">
+      <a:lvl9pPr marL="2914650" indent="-171450" algn="l" rtl="0" eaLnBrk="1" fontAlgn="base" hangingPunct="1">
         <a:spcBef>
           <a:spcPct val="20000"/>
         </a:spcBef>
@@ -3803,7 +3479,7 @@
 </file>
 
 <file path=ppt/slides/slide1.xml><?xml version="1.0" encoding="utf-8"?>
-<p:sld xmlns:a="http://schemas.openxmlformats.org/drawingml/2006/main" xmlns:r="http://schemas.openxmlformats.org/officeDocument/2006/relationships" xmlns:p="http://schemas.openxmlformats.org/presentationml/2006/main" showMasterSp="0">
+<p:sld xmlns:a="http://schemas.openxmlformats.org/drawingml/2006/main" xmlns:r="http://schemas.openxmlformats.org/officeDocument/2006/relationships" xmlns:p="http://schemas.openxmlformats.org/presentationml/2006/main">
   <p:cSld>
     <p:spTree>
       <p:nvGrpSpPr>
@@ -3821,10 +3497,10 @@
       </p:grpSpPr>
       <p:sp>
         <p:nvSpPr>
-          <p:cNvPr id="2050" name="Text Box 5">
+          <p:cNvPr id="4" name="Text Box 5">
             <a:extLst>
               <a:ext uri="{FF2B5EF4-FFF2-40B4-BE49-F238E27FC236}">
-                <a16:creationId xmlns:a16="http://schemas.microsoft.com/office/drawing/2014/main" id="{158FE83C-E802-4D3C-BA1B-3272B0C88574}"/>
+                <a16:creationId xmlns:a16="http://schemas.microsoft.com/office/drawing/2014/main" id="{9FF6AF55-D685-49B0-BD00-9D29DAD1A7AA}"/>
               </a:ext>
             </a:extLst>
           </p:cNvPr>
@@ -3835,16 +3511,19 @@
         </p:nvSpPr>
         <p:spPr bwMode="auto">
           <a:xfrm>
-            <a:off x="1143000" y="4116388"/>
-            <a:ext cx="6858000" cy="1155700"/>
+            <a:off x="419100" y="4457700"/>
+            <a:ext cx="8305800" cy="1155700"/>
           </a:xfrm>
           <a:prstGeom prst="rect">
             <a:avLst/>
           </a:prstGeom>
           <a:solidFill>
-            <a:srgbClr val="800000"/>
+            <a:schemeClr val="tx1">
+              <a:lumMod val="85000"/>
+              <a:lumOff val="15000"/>
+            </a:schemeClr>
           </a:solidFill>
-          <a:ln w="101600">
+          <a:ln w="12700">
             <a:solidFill>
               <a:schemeClr val="bg1"/>
             </a:solidFill>
@@ -3859,7 +3538,7 @@
           </a:effectLst>
         </p:spPr>
         <p:txBody>
-          <a:bodyPr>
+          <a:bodyPr wrap="square">
             <a:spAutoFit/>
           </a:bodyPr>
           <a:lstStyle>
@@ -3993,7 +3672,7 @@
               <a:buNone/>
               <a:defRPr/>
             </a:pPr>
-            <a:endParaRPr lang="en-US" altLang="en-US" sz="1725" u="sng">
+            <a:endParaRPr lang="en-US" altLang="en-US" sz="1725" u="sng" dirty="0">
               <a:solidFill>
                 <a:srgbClr val="FFFF00"/>
               </a:solidFill>
@@ -4010,11 +3689,11 @@
               <a:defRPr/>
             </a:pPr>
             <a:r>
-              <a:rPr lang="en-US" altLang="en-US" sz="3450" u="sng">
+              <a:rPr lang="en-US" altLang="en-US" dirty="0">
                 <a:solidFill>
-                  <a:srgbClr val="FFFF00"/>
+                  <a:schemeClr val="bg1"/>
                 </a:solidFill>
-                <a:latin typeface="Arial Black" panose="020B0A04020102020204" pitchFamily="34" charset="0"/>
+                <a:latin typeface="Open Sans Semibold" panose="020B0706030804020204"/>
               </a:rPr>
               <a:t>I AM THINE, O LORD</a:t>
             </a:r>
@@ -4029,7 +3708,7 @@
               <a:defRPr/>
             </a:pPr>
             <a:r>
-              <a:rPr lang="en-US" altLang="en-US" sz="1725" b="0">
+              <a:rPr lang="en-US" altLang="en-US" sz="1725" b="0" dirty="0">
                 <a:solidFill>
                   <a:srgbClr val="FFFF00"/>
                 </a:solidFill>
@@ -4049,7 +3728,7 @@
 </file>
 
 <file path=ppt/slides/slide2.xml><?xml version="1.0" encoding="utf-8"?>
-<p:sld xmlns:a="http://schemas.openxmlformats.org/drawingml/2006/main" xmlns:r="http://schemas.openxmlformats.org/officeDocument/2006/relationships" xmlns:p="http://schemas.openxmlformats.org/presentationml/2006/main" showMasterSp="0">
+<p:sld xmlns:a="http://schemas.openxmlformats.org/drawingml/2006/main" xmlns:r="http://schemas.openxmlformats.org/officeDocument/2006/relationships" xmlns:p="http://schemas.openxmlformats.org/presentationml/2006/main">
   <p:cSld>
     <p:spTree>
       <p:nvGrpSpPr>
@@ -4067,10 +3746,10 @@
       </p:grpSpPr>
       <p:sp>
         <p:nvSpPr>
-          <p:cNvPr id="3074" name="Text Box 2">
+          <p:cNvPr id="3" name="Text Box 2">
             <a:extLst>
               <a:ext uri="{FF2B5EF4-FFF2-40B4-BE49-F238E27FC236}">
-                <a16:creationId xmlns:a16="http://schemas.microsoft.com/office/drawing/2014/main" id="{74054F2E-4F5F-42CE-A40E-F8C2B919E7FE}"/>
+                <a16:creationId xmlns:a16="http://schemas.microsoft.com/office/drawing/2014/main" id="{8A5193BB-0E34-47FF-9F66-924AD1926FBA}"/>
               </a:ext>
             </a:extLst>
           </p:cNvPr>
@@ -4081,16 +3760,19 @@
         </p:nvSpPr>
         <p:spPr bwMode="auto">
           <a:xfrm>
-            <a:off x="1143000" y="4114800"/>
-            <a:ext cx="6858000" cy="1154162"/>
+            <a:off x="457200" y="4523482"/>
+            <a:ext cx="8229600" cy="1077218"/>
           </a:xfrm>
           <a:prstGeom prst="rect">
             <a:avLst/>
           </a:prstGeom>
           <a:solidFill>
-            <a:srgbClr val="800000"/>
+            <a:schemeClr val="tx1">
+              <a:lumMod val="85000"/>
+              <a:lumOff val="15000"/>
+            </a:schemeClr>
           </a:solidFill>
-          <a:ln w="101600">
+          <a:ln w="19050">
             <a:solidFill>
               <a:schemeClr val="bg1"/>
             </a:solidFill>
@@ -4105,71 +3787,62 @@
           </a:effectLst>
         </p:spPr>
         <p:txBody>
-          <a:bodyPr>
+          <a:bodyPr wrap="square">
             <a:spAutoFit/>
           </a:bodyPr>
           <a:lstStyle>
-            <a:lvl1pPr>
+            <a:defPPr>
+              <a:defRPr lang="en-US"/>
+            </a:defPPr>
+            <a:lvl1pPr algn="ctr" eaLnBrk="1" hangingPunct="1">
+              <a:buFontTx/>
+              <a:buNone/>
+              <a:defRPr sz="3200" b="0" u="none">
+                <a:solidFill>
+                  <a:srgbClr val="FFFF00"/>
+                </a:solidFill>
+                <a:latin typeface="Open Sans Semibold" panose="020B0706030804020204" pitchFamily="34" charset="0"/>
+                <a:ea typeface="Open Sans Semibold" panose="020B0706030804020204" pitchFamily="34" charset="0"/>
+                <a:cs typeface="Open Sans Semibold" panose="020B0706030804020204" pitchFamily="34" charset="0"/>
+              </a:defRPr>
+            </a:lvl1pPr>
+            <a:lvl2pPr marL="742950" indent="-285750" eaLnBrk="0" hangingPunct="0">
+              <a:spcBef>
+                <a:spcPct val="20000"/>
+              </a:spcBef>
+              <a:buChar char="–"/>
+              <a:defRPr sz="2800" b="1">
+                <a:latin typeface="Arial" panose="020B0604020202020204" pitchFamily="34" charset="0"/>
+              </a:defRPr>
+            </a:lvl2pPr>
+            <a:lvl3pPr marL="1143000" indent="-228600" eaLnBrk="0" hangingPunct="0">
               <a:spcBef>
                 <a:spcPct val="20000"/>
               </a:spcBef>
               <a:buChar char="•"/>
-              <a:defRPr sz="3200">
-                <a:solidFill>
-                  <a:schemeClr val="tx1"/>
-                </a:solidFill>
+              <a:defRPr sz="2400" b="1">
                 <a:latin typeface="Arial" panose="020B0604020202020204" pitchFamily="34" charset="0"/>
               </a:defRPr>
-            </a:lvl1pPr>
-            <a:lvl2pPr marL="742950" indent="-285750">
+            </a:lvl3pPr>
+            <a:lvl4pPr marL="1600200" indent="-228600" eaLnBrk="0" hangingPunct="0">
               <a:spcBef>
                 <a:spcPct val="20000"/>
               </a:spcBef>
               <a:buChar char="–"/>
-              <a:defRPr sz="2800">
-                <a:solidFill>
-                  <a:schemeClr val="tx1"/>
-                </a:solidFill>
-                <a:latin typeface="Arial" panose="020B0604020202020204" pitchFamily="34" charset="0"/>
-              </a:defRPr>
-            </a:lvl2pPr>
-            <a:lvl3pPr marL="1143000" indent="-228600">
-              <a:spcBef>
-                <a:spcPct val="20000"/>
-              </a:spcBef>
-              <a:buChar char="•"/>
-              <a:defRPr sz="2400">
-                <a:solidFill>
-                  <a:schemeClr val="tx1"/>
-                </a:solidFill>
-                <a:latin typeface="Arial" panose="020B0604020202020204" pitchFamily="34" charset="0"/>
-              </a:defRPr>
-            </a:lvl3pPr>
-            <a:lvl4pPr marL="1600200" indent="-228600">
-              <a:spcBef>
-                <a:spcPct val="20000"/>
-              </a:spcBef>
-              <a:buChar char="–"/>
-              <a:defRPr sz="2000">
-                <a:solidFill>
-                  <a:schemeClr val="tx1"/>
-                </a:solidFill>
+              <a:defRPr sz="2000" b="1">
                 <a:latin typeface="Arial" panose="020B0604020202020204" pitchFamily="34" charset="0"/>
               </a:defRPr>
             </a:lvl4pPr>
-            <a:lvl5pPr marL="2057400" indent="-228600">
+            <a:lvl5pPr marL="2057400" indent="-228600" eaLnBrk="0" hangingPunct="0">
               <a:spcBef>
                 <a:spcPct val="20000"/>
               </a:spcBef>
               <a:buChar char="»"/>
-              <a:defRPr sz="2000">
-                <a:solidFill>
-                  <a:schemeClr val="tx1"/>
-                </a:solidFill>
+              <a:defRPr sz="2000" b="1">
                 <a:latin typeface="Arial" panose="020B0604020202020204" pitchFamily="34" charset="0"/>
               </a:defRPr>
             </a:lvl5pPr>
-            <a:lvl6pPr marL="2514600" indent="-228600" eaLnBrk="0" fontAlgn="base" hangingPunct="0">
+            <a:lvl6pPr marL="2514600" indent="-228600" defTabSz="914400" eaLnBrk="0" fontAlgn="base" hangingPunct="0">
               <a:spcBef>
                 <a:spcPct val="20000"/>
               </a:spcBef>
@@ -4177,14 +3850,11 @@
                 <a:spcPct val="0"/>
               </a:spcAft>
               <a:buChar char="»"/>
-              <a:defRPr sz="2000">
-                <a:solidFill>
-                  <a:schemeClr val="tx1"/>
-                </a:solidFill>
+              <a:defRPr sz="2000" b="1">
                 <a:latin typeface="Arial" panose="020B0604020202020204" pitchFamily="34" charset="0"/>
               </a:defRPr>
             </a:lvl6pPr>
-            <a:lvl7pPr marL="2971800" indent="-228600" eaLnBrk="0" fontAlgn="base" hangingPunct="0">
+            <a:lvl7pPr marL="2971800" indent="-228600" defTabSz="914400" eaLnBrk="0" fontAlgn="base" hangingPunct="0">
               <a:spcBef>
                 <a:spcPct val="20000"/>
               </a:spcBef>
@@ -4192,14 +3862,11 @@
                 <a:spcPct val="0"/>
               </a:spcAft>
               <a:buChar char="»"/>
-              <a:defRPr sz="2000">
-                <a:solidFill>
-                  <a:schemeClr val="tx1"/>
-                </a:solidFill>
+              <a:defRPr sz="2000" b="1">
                 <a:latin typeface="Arial" panose="020B0604020202020204" pitchFamily="34" charset="0"/>
               </a:defRPr>
             </a:lvl7pPr>
-            <a:lvl8pPr marL="3429000" indent="-228600" eaLnBrk="0" fontAlgn="base" hangingPunct="0">
+            <a:lvl8pPr marL="3429000" indent="-228600" defTabSz="914400" eaLnBrk="0" fontAlgn="base" hangingPunct="0">
               <a:spcBef>
                 <a:spcPct val="20000"/>
               </a:spcBef>
@@ -4207,14 +3874,11 @@
                 <a:spcPct val="0"/>
               </a:spcAft>
               <a:buChar char="»"/>
-              <a:defRPr sz="2000">
-                <a:solidFill>
-                  <a:schemeClr val="tx1"/>
-                </a:solidFill>
+              <a:defRPr sz="2000" b="1">
                 <a:latin typeface="Arial" panose="020B0604020202020204" pitchFamily="34" charset="0"/>
               </a:defRPr>
             </a:lvl8pPr>
-            <a:lvl9pPr marL="3886200" indent="-228600" eaLnBrk="0" fontAlgn="base" hangingPunct="0">
+            <a:lvl9pPr marL="3886200" indent="-228600" defTabSz="914400" eaLnBrk="0" fontAlgn="base" hangingPunct="0">
               <a:spcBef>
                 <a:spcPct val="20000"/>
               </a:spcBef>
@@ -4222,58 +3886,34 @@
                 <a:spcPct val="0"/>
               </a:spcAft>
               <a:buChar char="»"/>
-              <a:defRPr sz="2000">
-                <a:solidFill>
-                  <a:schemeClr val="tx1"/>
-                </a:solidFill>
+              <a:defRPr sz="2000" b="1">
                 <a:latin typeface="Arial" panose="020B0604020202020204" pitchFamily="34" charset="0"/>
               </a:defRPr>
             </a:lvl9pPr>
           </a:lstStyle>
           <a:p>
-            <a:pPr algn="ctr" eaLnBrk="1" hangingPunct="1">
-              <a:spcBef>
-                <a:spcPct val="0"/>
-              </a:spcBef>
-              <a:buFontTx/>
-              <a:buNone/>
-              <a:defRPr/>
-            </a:pPr>
-            <a:r>
-              <a:rPr lang="en-US" altLang="en-US" sz="3450">
+            <a:r>
+              <a:rPr lang="en-US" dirty="0" err="1">
                 <a:solidFill>
-                  <a:srgbClr val="FFFF00"/>
+                  <a:schemeClr val="bg1"/>
                 </a:solidFill>
-                <a:latin typeface="Arial Black" panose="020B0A04020102020204" pitchFamily="34" charset="0"/>
               </a:rPr>
-              <a:t>Lyrics</a:t>
-            </a:r>
-            <a:endParaRPr lang="en-US" altLang="en-US" sz="3450" dirty="0">
+              <a:t>Lyricssssssssssssssssssssssssssssssssssssssssssssssssssss</a:t>
+            </a:r>
+            <a:endParaRPr lang="en-US" dirty="0">
               <a:solidFill>
-                <a:srgbClr val="FFFF00"/>
+                <a:schemeClr val="bg1"/>
               </a:solidFill>
-              <a:latin typeface="Arial Black" panose="020B0A04020102020204" pitchFamily="34" charset="0"/>
             </a:endParaRPr>
           </a:p>
-          <a:p>
-            <a:pPr algn="ctr" eaLnBrk="1" hangingPunct="1">
-              <a:spcBef>
-                <a:spcPct val="0"/>
-              </a:spcBef>
-              <a:buFontTx/>
-              <a:buNone/>
-              <a:defRPr/>
-            </a:pPr>
-            <a:endParaRPr lang="en-US" altLang="en-US" sz="3450" dirty="0">
-              <a:solidFill>
-                <a:srgbClr val="FFFF00"/>
-              </a:solidFill>
-              <a:latin typeface="Arial Black" panose="020B0A04020102020204" pitchFamily="34" charset="0"/>
-            </a:endParaRPr>
-          </a:p>
         </p:txBody>
       </p:sp>
     </p:spTree>
+    <p:extLst>
+      <p:ext uri="{BB962C8B-B14F-4D97-AF65-F5344CB8AC3E}">
+        <p14:creationId xmlns:p14="http://schemas.microsoft.com/office/powerpoint/2010/main" val="869691461"/>
+      </p:ext>
+    </p:extLst>
   </p:cSld>
   <p:clrMapOvr>
     <a:masterClrMapping/>
@@ -4300,10 +3940,10 @@
       </p:grpSpPr>
       <p:sp>
         <p:nvSpPr>
-          <p:cNvPr id="34818" name="Text Box 2">
+          <p:cNvPr id="3" name="Text Box 2">
             <a:extLst>
               <a:ext uri="{FF2B5EF4-FFF2-40B4-BE49-F238E27FC236}">
-                <a16:creationId xmlns:a16="http://schemas.microsoft.com/office/drawing/2014/main" id="{626744C3-AB44-403D-B0D8-D6A252B133E0}"/>
+                <a16:creationId xmlns:a16="http://schemas.microsoft.com/office/drawing/2014/main" id="{8A5193BB-0E34-47FF-9F66-924AD1926FBA}"/>
               </a:ext>
             </a:extLst>
           </p:cNvPr>
@@ -4314,16 +3954,19 @@
         </p:nvSpPr>
         <p:spPr bwMode="auto">
           <a:xfrm>
-            <a:off x="1143000" y="4114800"/>
-            <a:ext cx="6858000" cy="1154162"/>
+            <a:off x="457200" y="4523482"/>
+            <a:ext cx="8305800" cy="1077218"/>
           </a:xfrm>
           <a:prstGeom prst="rect">
             <a:avLst/>
           </a:prstGeom>
           <a:solidFill>
-            <a:srgbClr val="800000"/>
+            <a:schemeClr val="tx1">
+              <a:lumMod val="85000"/>
+              <a:lumOff val="15000"/>
+            </a:schemeClr>
           </a:solidFill>
-          <a:ln w="101600">
+          <a:ln w="19050">
             <a:solidFill>
               <a:schemeClr val="bg1"/>
             </a:solidFill>
@@ -4338,71 +3981,62 @@
           </a:effectLst>
         </p:spPr>
         <p:txBody>
-          <a:bodyPr>
+          <a:bodyPr wrap="square">
             <a:spAutoFit/>
           </a:bodyPr>
           <a:lstStyle>
-            <a:lvl1pPr>
+            <a:defPPr>
+              <a:defRPr lang="en-US"/>
+            </a:defPPr>
+            <a:lvl1pPr algn="ctr" eaLnBrk="1" hangingPunct="1">
+              <a:buFontTx/>
+              <a:buNone/>
+              <a:defRPr sz="3200" b="0" u="none">
+                <a:solidFill>
+                  <a:srgbClr val="FFFF00"/>
+                </a:solidFill>
+                <a:latin typeface="Open Sans Semibold" panose="020B0706030804020204" pitchFamily="34" charset="0"/>
+                <a:ea typeface="Open Sans Semibold" panose="020B0706030804020204" pitchFamily="34" charset="0"/>
+                <a:cs typeface="Open Sans Semibold" panose="020B0706030804020204" pitchFamily="34" charset="0"/>
+              </a:defRPr>
+            </a:lvl1pPr>
+            <a:lvl2pPr marL="742950" indent="-285750" eaLnBrk="0" hangingPunct="0">
+              <a:spcBef>
+                <a:spcPct val="20000"/>
+              </a:spcBef>
+              <a:buChar char="–"/>
+              <a:defRPr sz="2800" b="1">
+                <a:latin typeface="Arial" panose="020B0604020202020204" pitchFamily="34" charset="0"/>
+              </a:defRPr>
+            </a:lvl2pPr>
+            <a:lvl3pPr marL="1143000" indent="-228600" eaLnBrk="0" hangingPunct="0">
               <a:spcBef>
                 <a:spcPct val="20000"/>
               </a:spcBef>
               <a:buChar char="•"/>
-              <a:defRPr sz="3200">
-                <a:solidFill>
-                  <a:schemeClr val="tx1"/>
-                </a:solidFill>
+              <a:defRPr sz="2400" b="1">
                 <a:latin typeface="Arial" panose="020B0604020202020204" pitchFamily="34" charset="0"/>
               </a:defRPr>
-            </a:lvl1pPr>
-            <a:lvl2pPr marL="742950" indent="-285750">
+            </a:lvl3pPr>
+            <a:lvl4pPr marL="1600200" indent="-228600" eaLnBrk="0" hangingPunct="0">
               <a:spcBef>
                 <a:spcPct val="20000"/>
               </a:spcBef>
               <a:buChar char="–"/>
-              <a:defRPr sz="2800">
-                <a:solidFill>
-                  <a:schemeClr val="tx1"/>
-                </a:solidFill>
-                <a:latin typeface="Arial" panose="020B0604020202020204" pitchFamily="34" charset="0"/>
-              </a:defRPr>
-            </a:lvl2pPr>
-            <a:lvl3pPr marL="1143000" indent="-228600">
-              <a:spcBef>
-                <a:spcPct val="20000"/>
-              </a:spcBef>
-              <a:buChar char="•"/>
-              <a:defRPr sz="2400">
-                <a:solidFill>
-                  <a:schemeClr val="tx1"/>
-                </a:solidFill>
-                <a:latin typeface="Arial" panose="020B0604020202020204" pitchFamily="34" charset="0"/>
-              </a:defRPr>
-            </a:lvl3pPr>
-            <a:lvl4pPr marL="1600200" indent="-228600">
-              <a:spcBef>
-                <a:spcPct val="20000"/>
-              </a:spcBef>
-              <a:buChar char="–"/>
-              <a:defRPr sz="2000">
-                <a:solidFill>
-                  <a:schemeClr val="tx1"/>
-                </a:solidFill>
+              <a:defRPr sz="2000" b="1">
                 <a:latin typeface="Arial" panose="020B0604020202020204" pitchFamily="34" charset="0"/>
               </a:defRPr>
             </a:lvl4pPr>
-            <a:lvl5pPr marL="2057400" indent="-228600">
+            <a:lvl5pPr marL="2057400" indent="-228600" eaLnBrk="0" hangingPunct="0">
               <a:spcBef>
                 <a:spcPct val="20000"/>
               </a:spcBef>
               <a:buChar char="»"/>
-              <a:defRPr sz="2000">
-                <a:solidFill>
-                  <a:schemeClr val="tx1"/>
-                </a:solidFill>
+              <a:defRPr sz="2000" b="1">
                 <a:latin typeface="Arial" panose="020B0604020202020204" pitchFamily="34" charset="0"/>
               </a:defRPr>
             </a:lvl5pPr>
-            <a:lvl6pPr marL="2514600" indent="-228600" eaLnBrk="0" fontAlgn="base" hangingPunct="0">
+            <a:lvl6pPr marL="2514600" indent="-228600" defTabSz="914400" eaLnBrk="0" fontAlgn="base" hangingPunct="0">
               <a:spcBef>
                 <a:spcPct val="20000"/>
               </a:spcBef>
@@ -4410,14 +4044,11 @@
                 <a:spcPct val="0"/>
               </a:spcAft>
               <a:buChar char="»"/>
-              <a:defRPr sz="2000">
-                <a:solidFill>
-                  <a:schemeClr val="tx1"/>
-                </a:solidFill>
+              <a:defRPr sz="2000" b="1">
                 <a:latin typeface="Arial" panose="020B0604020202020204" pitchFamily="34" charset="0"/>
               </a:defRPr>
             </a:lvl6pPr>
-            <a:lvl7pPr marL="2971800" indent="-228600" eaLnBrk="0" fontAlgn="base" hangingPunct="0">
+            <a:lvl7pPr marL="2971800" indent="-228600" defTabSz="914400" eaLnBrk="0" fontAlgn="base" hangingPunct="0">
               <a:spcBef>
                 <a:spcPct val="20000"/>
               </a:spcBef>
@@ -4425,14 +4056,11 @@
                 <a:spcPct val="0"/>
               </a:spcAft>
               <a:buChar char="»"/>
-              <a:defRPr sz="2000">
-                <a:solidFill>
-                  <a:schemeClr val="tx1"/>
-                </a:solidFill>
+              <a:defRPr sz="2000" b="1">
                 <a:latin typeface="Arial" panose="020B0604020202020204" pitchFamily="34" charset="0"/>
               </a:defRPr>
             </a:lvl7pPr>
-            <a:lvl8pPr marL="3429000" indent="-228600" eaLnBrk="0" fontAlgn="base" hangingPunct="0">
+            <a:lvl8pPr marL="3429000" indent="-228600" defTabSz="914400" eaLnBrk="0" fontAlgn="base" hangingPunct="0">
               <a:spcBef>
                 <a:spcPct val="20000"/>
               </a:spcBef>
@@ -4440,14 +4068,11 @@
                 <a:spcPct val="0"/>
               </a:spcAft>
               <a:buChar char="»"/>
-              <a:defRPr sz="2000">
-                <a:solidFill>
-                  <a:schemeClr val="tx1"/>
-                </a:solidFill>
+              <a:defRPr sz="2000" b="1">
                 <a:latin typeface="Arial" panose="020B0604020202020204" pitchFamily="34" charset="0"/>
               </a:defRPr>
             </a:lvl8pPr>
-            <a:lvl9pPr marL="3886200" indent="-228600" eaLnBrk="0" fontAlgn="base" hangingPunct="0">
+            <a:lvl9pPr marL="3886200" indent="-228600" defTabSz="914400" eaLnBrk="0" fontAlgn="base" hangingPunct="0">
               <a:spcBef>
                 <a:spcPct val="20000"/>
               </a:spcBef>
@@ -4455,47 +4080,37 @@
                 <a:spcPct val="0"/>
               </a:spcAft>
               <a:buChar char="»"/>
-              <a:defRPr sz="2000">
-                <a:solidFill>
-                  <a:schemeClr val="tx1"/>
-                </a:solidFill>
+              <a:defRPr sz="2000" b="1">
                 <a:latin typeface="Arial" panose="020B0604020202020204" pitchFamily="34" charset="0"/>
               </a:defRPr>
             </a:lvl9pPr>
           </a:lstStyle>
           <a:p>
-            <a:pPr algn="ctr" eaLnBrk="1" hangingPunct="1">
-              <a:spcBef>
-                <a:spcPct val="0"/>
-              </a:spcBef>
-              <a:buFontTx/>
-              <a:buNone/>
-              <a:defRPr/>
-            </a:pPr>
-            <a:r>
-              <a:rPr lang="en-US" altLang="en-US" sz="3450" i="1">
+            <a:r>
+              <a:rPr lang="en-US" dirty="0" err="1">
                 <a:solidFill>
-                  <a:srgbClr val="FFFF00"/>
+                  <a:schemeClr val="bg1"/>
                 </a:solidFill>
-                <a:latin typeface="Arial Black" panose="020B0A04020102020204" pitchFamily="34" charset="0"/>
               </a:rPr>
-              <a:t>ENDDDDDDDDDDDDDDDDDDDDDDDDD</a:t>
-            </a:r>
-            <a:endParaRPr lang="en-US" altLang="en-US" sz="3450" i="1" dirty="0">
-              <a:solidFill>
-                <a:srgbClr val="FFFF00"/>
-              </a:solidFill>
-              <a:latin typeface="Arial Black" panose="020B0A04020102020204" pitchFamily="34" charset="0"/>
-            </a:endParaRPr>
-          </a:p>
-        </p:txBody>
-      </p:sp>
-      <p:sp>
-        <p:nvSpPr>
-          <p:cNvPr id="34819" name="Text Box 3">
+              <a:t>Lyricsssseeeennnnnnnnnnddddddddddddddd</a:t>
+            </a:r>
+            <a:r>
+              <a:rPr lang="en-US" dirty="0">
+                <a:solidFill>
+                  <a:schemeClr val="bg1"/>
+                </a:solidFill>
+              </a:rPr>
+              <a:t>.</a:t>
+            </a:r>
+          </a:p>
+        </p:txBody>
+      </p:sp>
+      <p:sp>
+        <p:nvSpPr>
+          <p:cNvPr id="5" name="Text Box 3">
             <a:extLst>
               <a:ext uri="{FF2B5EF4-FFF2-40B4-BE49-F238E27FC236}">
-                <a16:creationId xmlns:a16="http://schemas.microsoft.com/office/drawing/2014/main" id="{94E32D59-05C4-4235-97EC-EC9AA367EAAB}"/>
+                <a16:creationId xmlns:a16="http://schemas.microsoft.com/office/drawing/2014/main" id="{7E721963-D6EB-4700-8287-31747E881320}"/>
               </a:ext>
             </a:extLst>
           </p:cNvPr>
@@ -4506,8 +4121,8 @@
         </p:nvSpPr>
         <p:spPr bwMode="auto">
           <a:xfrm>
-            <a:off x="7602538" y="4991100"/>
-            <a:ext cx="423862" cy="254000"/>
+            <a:off x="8343900" y="5295900"/>
+            <a:ext cx="419100" cy="253916"/>
           </a:xfrm>
           <a:prstGeom prst="rect">
             <a:avLst/>
@@ -4516,175 +4131,138 @@
           <a:ln>
             <a:noFill/>
           </a:ln>
-          <a:effectLst/>
           <a:extLst>
             <a:ext uri="{909E8E84-426E-40DD-AFC4-6F175D3DCCD1}">
               <a14:hiddenFill xmlns:a14="http://schemas.microsoft.com/office/drawing/2010/main">
                 <a:solidFill>
-                  <a:schemeClr val="accent1"/>
+                  <a:srgbClr val="FFFFFF"/>
                 </a:solidFill>
               </a14:hiddenFill>
             </a:ext>
             <a:ext uri="{91240B29-F687-4F45-9708-019B960494DF}">
               <a14:hiddenLine xmlns:a14="http://schemas.microsoft.com/office/drawing/2010/main" w="9525">
                 <a:solidFill>
-                  <a:schemeClr val="tx1"/>
+                  <a:srgbClr val="000000"/>
                 </a:solidFill>
                 <a:miter lim="800000"/>
                 <a:headEnd/>
                 <a:tailEnd/>
               </a14:hiddenLine>
             </a:ext>
-            <a:ext uri="{AF507438-7753-43E0-B8FC-AC1667EBCBE1}">
-              <a14:hiddenEffects xmlns:a14="http://schemas.microsoft.com/office/drawing/2010/main">
-                <a:effectLst>
-                  <a:outerShdw dist="35921" dir="2700000" algn="ctr" rotWithShape="0">
-                    <a:schemeClr val="bg2"/>
-                  </a:outerShdw>
-                </a:effectLst>
-              </a14:hiddenEffects>
-            </a:ext>
           </a:extLst>
         </p:spPr>
         <p:txBody>
-          <a:bodyPr wrap="none">
+          <a:bodyPr wrap="square">
             <a:spAutoFit/>
           </a:bodyPr>
           <a:lstStyle>
-            <a:lvl1pPr>
-              <a:spcBef>
-                <a:spcPct val="20000"/>
-              </a:spcBef>
-              <a:buChar char="•"/>
-              <a:defRPr sz="3200">
+            <a:lvl1pPr eaLnBrk="0" hangingPunct="0">
+              <a:defRPr sz="1400">
                 <a:solidFill>
                   <a:schemeClr val="tx1"/>
                 </a:solidFill>
-                <a:latin typeface="Arial" panose="020B0604020202020204" pitchFamily="34" charset="0"/>
+                <a:latin typeface="Arial" charset="0"/>
               </a:defRPr>
             </a:lvl1pPr>
-            <a:lvl2pPr marL="742950" indent="-285750">
-              <a:spcBef>
-                <a:spcPct val="20000"/>
-              </a:spcBef>
-              <a:buChar char="–"/>
-              <a:defRPr sz="2800">
+            <a:lvl2pPr marL="742950" indent="-285750" eaLnBrk="0" hangingPunct="0">
+              <a:defRPr sz="1400">
                 <a:solidFill>
                   <a:schemeClr val="tx1"/>
                 </a:solidFill>
-                <a:latin typeface="Arial" panose="020B0604020202020204" pitchFamily="34" charset="0"/>
+                <a:latin typeface="Arial" charset="0"/>
               </a:defRPr>
             </a:lvl2pPr>
-            <a:lvl3pPr marL="1143000" indent="-228600">
-              <a:spcBef>
-                <a:spcPct val="20000"/>
-              </a:spcBef>
-              <a:buChar char="•"/>
-              <a:defRPr sz="2400">
+            <a:lvl3pPr marL="1143000" indent="-228600" eaLnBrk="0" hangingPunct="0">
+              <a:defRPr sz="1400">
                 <a:solidFill>
                   <a:schemeClr val="tx1"/>
                 </a:solidFill>
-                <a:latin typeface="Arial" panose="020B0604020202020204" pitchFamily="34" charset="0"/>
+                <a:latin typeface="Arial" charset="0"/>
               </a:defRPr>
             </a:lvl3pPr>
-            <a:lvl4pPr marL="1600200" indent="-228600">
-              <a:spcBef>
-                <a:spcPct val="20000"/>
-              </a:spcBef>
-              <a:buChar char="–"/>
-              <a:defRPr sz="2000">
+            <a:lvl4pPr marL="1600200" indent="-228600" eaLnBrk="0" hangingPunct="0">
+              <a:defRPr sz="1400">
                 <a:solidFill>
                   <a:schemeClr val="tx1"/>
                 </a:solidFill>
-                <a:latin typeface="Arial" panose="020B0604020202020204" pitchFamily="34" charset="0"/>
+                <a:latin typeface="Arial" charset="0"/>
               </a:defRPr>
             </a:lvl4pPr>
-            <a:lvl5pPr marL="2057400" indent="-228600">
-              <a:spcBef>
-                <a:spcPct val="20000"/>
-              </a:spcBef>
-              <a:buChar char="»"/>
-              <a:defRPr sz="2000">
+            <a:lvl5pPr marL="2057400" indent="-228600" eaLnBrk="0" hangingPunct="0">
+              <a:defRPr sz="1400">
                 <a:solidFill>
                   <a:schemeClr val="tx1"/>
                 </a:solidFill>
-                <a:latin typeface="Arial" panose="020B0604020202020204" pitchFamily="34" charset="0"/>
+                <a:latin typeface="Arial" charset="0"/>
               </a:defRPr>
             </a:lvl5pPr>
             <a:lvl6pPr marL="2514600" indent="-228600" eaLnBrk="0" fontAlgn="base" hangingPunct="0">
               <a:spcBef>
-                <a:spcPct val="20000"/>
+                <a:spcPct val="0"/>
               </a:spcBef>
               <a:spcAft>
                 <a:spcPct val="0"/>
               </a:spcAft>
-              <a:buChar char="»"/>
-              <a:defRPr sz="2000">
+              <a:defRPr sz="1400">
                 <a:solidFill>
                   <a:schemeClr val="tx1"/>
                 </a:solidFill>
-                <a:latin typeface="Arial" panose="020B0604020202020204" pitchFamily="34" charset="0"/>
+                <a:latin typeface="Arial" charset="0"/>
               </a:defRPr>
             </a:lvl6pPr>
             <a:lvl7pPr marL="2971800" indent="-228600" eaLnBrk="0" fontAlgn="base" hangingPunct="0">
               <a:spcBef>
-                <a:spcPct val="20000"/>
+                <a:spcPct val="0"/>
               </a:spcBef>
               <a:spcAft>
                 <a:spcPct val="0"/>
               </a:spcAft>
-              <a:buChar char="»"/>
-              <a:defRPr sz="2000">
+              <a:defRPr sz="1400">
                 <a:solidFill>
                   <a:schemeClr val="tx1"/>
                 </a:solidFill>
-                <a:latin typeface="Arial" panose="020B0604020202020204" pitchFamily="34" charset="0"/>
+                <a:latin typeface="Arial" charset="0"/>
               </a:defRPr>
             </a:lvl7pPr>
             <a:lvl8pPr marL="3429000" indent="-228600" eaLnBrk="0" fontAlgn="base" hangingPunct="0">
               <a:spcBef>
-                <a:spcPct val="20000"/>
+                <a:spcPct val="0"/>
               </a:spcBef>
               <a:spcAft>
                 <a:spcPct val="0"/>
               </a:spcAft>
-              <a:buChar char="»"/>
-              <a:defRPr sz="2000">
+              <a:defRPr sz="1400">
                 <a:solidFill>
                   <a:schemeClr val="tx1"/>
                 </a:solidFill>
-                <a:latin typeface="Arial" panose="020B0604020202020204" pitchFamily="34" charset="0"/>
+                <a:latin typeface="Arial" charset="0"/>
               </a:defRPr>
             </a:lvl8pPr>
             <a:lvl9pPr marL="3886200" indent="-228600" eaLnBrk="0" fontAlgn="base" hangingPunct="0">
               <a:spcBef>
-                <a:spcPct val="20000"/>
+                <a:spcPct val="0"/>
               </a:spcBef>
               <a:spcAft>
                 <a:spcPct val="0"/>
               </a:spcAft>
-              <a:buChar char="»"/>
-              <a:defRPr sz="2000">
+              <a:defRPr sz="1400">
                 <a:solidFill>
                   <a:schemeClr val="tx1"/>
                 </a:solidFill>
-                <a:latin typeface="Arial" panose="020B0604020202020204" pitchFamily="34" charset="0"/>
+                <a:latin typeface="Arial" charset="0"/>
               </a:defRPr>
             </a:lvl9pPr>
           </a:lstStyle>
           <a:p>
-            <a:pPr algn="ctr" eaLnBrk="1" hangingPunct="1">
+            <a:pPr eaLnBrk="1" hangingPunct="1">
               <a:spcBef>
-                <a:spcPct val="0"/>
+                <a:spcPct val="50000"/>
               </a:spcBef>
-              <a:buFontTx/>
-              <a:buNone/>
-              <a:defRPr/>
             </a:pPr>
             <a:r>
-              <a:rPr lang="en-US" altLang="en-US" sz="1050" dirty="0">
+              <a:rPr lang="en-US" sz="1050" dirty="0">
                 <a:solidFill>
-                  <a:srgbClr val="FFFF00"/>
+                  <a:schemeClr val="bg1"/>
                 </a:solidFill>
               </a:rPr>
               <a:t>end</a:t>
@@ -4693,6 +4271,11 @@
         </p:txBody>
       </p:sp>
     </p:spTree>
+    <p:extLst>
+      <p:ext uri="{BB962C8B-B14F-4D97-AF65-F5344CB8AC3E}">
+        <p14:creationId xmlns:p14="http://schemas.microsoft.com/office/powerpoint/2010/main" val="586317846"/>
+      </p:ext>
+    </p:extLst>
   </p:cSld>
   <p:clrMapOvr>
     <a:masterClrMapping/>
@@ -4701,9 +4284,9 @@
 </file>
 
 <file path=ppt/theme/theme1.xml><?xml version="1.0" encoding="utf-8"?>
-<a:theme xmlns:a="http://schemas.openxmlformats.org/drawingml/2006/main" name="Default Design">
+<a:theme xmlns:a="http://schemas.openxmlformats.org/drawingml/2006/main" name="A Common Love (welcome song)">
   <a:themeElements>
-    <a:clrScheme name="Default Design 1">
+    <a:clrScheme name="A Common Love (welcome song) 1">
       <a:dk1>
         <a:srgbClr val="000000"/>
       </a:dk1>
@@ -4741,7 +4324,7 @@
         <a:srgbClr val="99CC00"/>
       </a:folHlink>
     </a:clrScheme>
-    <a:fontScheme name="Default Design">
+    <a:fontScheme name="A Common Love (welcome song)">
       <a:majorFont>
         <a:latin typeface="Arial"/>
         <a:ea typeface=""/>
@@ -4920,157 +4503,10 @@
       </a:bgFillStyleLst>
     </a:fmtScheme>
   </a:themeElements>
-  <a:objectDefaults>
-    <a:spDef>
-      <a:spPr bwMode="auto">
-        <a:xfrm>
-          <a:off x="0" y="0"/>
-          <a:ext cx="1" cy="1"/>
-        </a:xfrm>
-        <a:custGeom>
-          <a:avLst/>
-          <a:gdLst/>
-          <a:ahLst/>
-          <a:cxnLst/>
-          <a:rect l="0" t="0" r="0" b="0"/>
-          <a:pathLst/>
-        </a:custGeom>
-        <a:solidFill>
-          <a:schemeClr val="accent1"/>
-        </a:solidFill>
-        <a:ln w="9525" cap="flat" cmpd="sng" algn="ctr">
-          <a:solidFill>
-            <a:schemeClr val="tx1"/>
-          </a:solidFill>
-          <a:prstDash val="solid"/>
-          <a:round/>
-          <a:headEnd type="none" w="med" len="med"/>
-          <a:tailEnd type="none" w="med" len="med"/>
-        </a:ln>
-        <a:effectLst/>
-        <a:extLst>
-          <a:ext uri="{AF507438-7753-43E0-B8FC-AC1667EBCBE1}">
-            <a14:hiddenEffects xmlns:a14="http://schemas.microsoft.com/office/drawing/2010/main">
-              <a:effectLst>
-                <a:outerShdw dist="35921" dir="2700000" algn="ctr" rotWithShape="0">
-                  <a:schemeClr val="bg2"/>
-                </a:outerShdw>
-              </a:effectLst>
-            </a14:hiddenEffects>
-          </a:ext>
-        </a:extLst>
-      </a:spPr>
-      <a:bodyPr vert="horz" wrap="square" lIns="91440" tIns="45720" rIns="91440" bIns="45720" numCol="1" anchor="t" anchorCtr="0" compatLnSpc="1">
-        <a:prstTxWarp prst="textNoShape">
-          <a:avLst/>
-        </a:prstTxWarp>
-      </a:bodyPr>
-      <a:lstStyle>
-        <a:defPPr marL="0" marR="0" indent="0" algn="ctr" defTabSz="914400" rtl="0" eaLnBrk="1" fontAlgn="base" latinLnBrk="0" hangingPunct="1">
-          <a:lnSpc>
-            <a:spcPct val="100000"/>
-          </a:lnSpc>
-          <a:spcBef>
-            <a:spcPct val="0"/>
-          </a:spcBef>
-          <a:spcAft>
-            <a:spcPct val="0"/>
-          </a:spcAft>
-          <a:buClrTx/>
-          <a:buSzTx/>
-          <a:buFontTx/>
-          <a:buNone/>
-          <a:tabLst/>
-          <a:defRPr kumimoji="0" lang="en-US" sz="4600" b="1" i="0" u="none" strike="noStrike" cap="none" normalizeH="0" baseline="0" smtClean="0">
-            <a:ln>
-              <a:noFill/>
-            </a:ln>
-            <a:solidFill>
-              <a:schemeClr val="tx1"/>
-            </a:solidFill>
-            <a:effectLst/>
-            <a:latin typeface="Arial" charset="0"/>
-          </a:defRPr>
-        </a:defPPr>
-      </a:lstStyle>
-    </a:spDef>
-    <a:lnDef>
-      <a:spPr bwMode="auto">
-        <a:xfrm>
-          <a:off x="0" y="0"/>
-          <a:ext cx="1" cy="1"/>
-        </a:xfrm>
-        <a:custGeom>
-          <a:avLst/>
-          <a:gdLst/>
-          <a:ahLst/>
-          <a:cxnLst/>
-          <a:rect l="0" t="0" r="0" b="0"/>
-          <a:pathLst/>
-        </a:custGeom>
-        <a:solidFill>
-          <a:schemeClr val="accent1"/>
-        </a:solidFill>
-        <a:ln w="9525" cap="flat" cmpd="sng" algn="ctr">
-          <a:solidFill>
-            <a:schemeClr val="tx1"/>
-          </a:solidFill>
-          <a:prstDash val="solid"/>
-          <a:round/>
-          <a:headEnd type="none" w="med" len="med"/>
-          <a:tailEnd type="none" w="med" len="med"/>
-        </a:ln>
-        <a:effectLst/>
-        <a:extLst>
-          <a:ext uri="{AF507438-7753-43E0-B8FC-AC1667EBCBE1}">
-            <a14:hiddenEffects xmlns:a14="http://schemas.microsoft.com/office/drawing/2010/main">
-              <a:effectLst>
-                <a:outerShdw dist="35921" dir="2700000" algn="ctr" rotWithShape="0">
-                  <a:schemeClr val="bg2"/>
-                </a:outerShdw>
-              </a:effectLst>
-            </a14:hiddenEffects>
-          </a:ext>
-        </a:extLst>
-      </a:spPr>
-      <a:bodyPr vert="horz" wrap="square" lIns="91440" tIns="45720" rIns="91440" bIns="45720" numCol="1" anchor="t" anchorCtr="0" compatLnSpc="1">
-        <a:prstTxWarp prst="textNoShape">
-          <a:avLst/>
-        </a:prstTxWarp>
-      </a:bodyPr>
-      <a:lstStyle>
-        <a:defPPr marL="0" marR="0" indent="0" algn="ctr" defTabSz="914400" rtl="0" eaLnBrk="1" fontAlgn="base" latinLnBrk="0" hangingPunct="1">
-          <a:lnSpc>
-            <a:spcPct val="100000"/>
-          </a:lnSpc>
-          <a:spcBef>
-            <a:spcPct val="0"/>
-          </a:spcBef>
-          <a:spcAft>
-            <a:spcPct val="0"/>
-          </a:spcAft>
-          <a:buClrTx/>
-          <a:buSzTx/>
-          <a:buFontTx/>
-          <a:buNone/>
-          <a:tabLst/>
-          <a:defRPr kumimoji="0" lang="en-US" sz="4600" b="1" i="0" u="none" strike="noStrike" cap="none" normalizeH="0" baseline="0" smtClean="0">
-            <a:ln>
-              <a:noFill/>
-            </a:ln>
-            <a:solidFill>
-              <a:schemeClr val="tx1"/>
-            </a:solidFill>
-            <a:effectLst/>
-            <a:latin typeface="Arial" charset="0"/>
-          </a:defRPr>
-        </a:defPPr>
-      </a:lstStyle>
-    </a:lnDef>
-  </a:objectDefaults>
+  <a:objectDefaults/>
   <a:extraClrSchemeLst>
     <a:extraClrScheme>
-      <a:clrScheme name="Default Design 1">
+      <a:clrScheme name="A Common Love (welcome song) 1">
         <a:dk1>
           <a:srgbClr val="000000"/>
         </a:dk1>
@@ -5111,7 +4547,7 @@
       <a:clrMap bg1="lt1" tx1="dk1" bg2="lt2" tx2="dk2" accent1="accent1" accent2="accent2" accent3="accent3" accent4="accent4" accent5="accent5" accent6="accent6" hlink="hlink" folHlink="folHlink"/>
     </a:extraClrScheme>
     <a:extraClrScheme>
-      <a:clrScheme name="Default Design 2">
+      <a:clrScheme name="A Common Love (welcome song) 2">
         <a:dk1>
           <a:srgbClr val="000000"/>
         </a:dk1>
@@ -5152,7 +4588,7 @@
       <a:clrMap bg1="lt1" tx1="dk1" bg2="lt2" tx2="dk2" accent1="accent1" accent2="accent2" accent3="accent3" accent4="accent4" accent5="accent5" accent6="accent6" hlink="hlink" folHlink="folHlink"/>
     </a:extraClrScheme>
     <a:extraClrScheme>
-      <a:clrScheme name="Default Design 3">
+      <a:clrScheme name="A Common Love (welcome song) 3">
         <a:dk1>
           <a:srgbClr val="000000"/>
         </a:dk1>
@@ -5193,7 +4629,7 @@
       <a:clrMap bg1="lt1" tx1="dk1" bg2="lt2" tx2="dk2" accent1="accent1" accent2="accent2" accent3="accent3" accent4="accent4" accent5="accent5" accent6="accent6" hlink="hlink" folHlink="folHlink"/>
     </a:extraClrScheme>
     <a:extraClrScheme>
-      <a:clrScheme name="Default Design 4">
+      <a:clrScheme name="A Common Love (welcome song) 4">
         <a:dk1>
           <a:srgbClr val="000000"/>
         </a:dk1>
@@ -5234,7 +4670,7 @@
       <a:clrMap bg1="lt1" tx1="dk1" bg2="lt2" tx2="dk2" accent1="accent1" accent2="accent2" accent3="accent3" accent4="accent4" accent5="accent5" accent6="accent6" hlink="hlink" folHlink="folHlink"/>
     </a:extraClrScheme>
     <a:extraClrScheme>
-      <a:clrScheme name="Default Design 5">
+      <a:clrScheme name="A Common Love (welcome song) 5">
         <a:dk1>
           <a:srgbClr val="000000"/>
         </a:dk1>
@@ -5275,7 +4711,7 @@
       <a:clrMap bg1="lt1" tx1="dk1" bg2="lt2" tx2="dk2" accent1="accent1" accent2="accent2" accent3="accent3" accent4="accent4" accent5="accent5" accent6="accent6" hlink="hlink" folHlink="folHlink"/>
     </a:extraClrScheme>
     <a:extraClrScheme>
-      <a:clrScheme name="Default Design 6">
+      <a:clrScheme name="A Common Love (welcome song) 6">
         <a:dk1>
           <a:srgbClr val="005A58"/>
         </a:dk1>
@@ -5316,7 +4752,7 @@
       <a:clrMap bg1="dk2" tx1="lt1" bg2="dk1" tx2="lt2" accent1="accent1" accent2="accent2" accent3="accent3" accent4="accent4" accent5="accent5" accent6="accent6" hlink="hlink" folHlink="folHlink"/>
     </a:extraClrScheme>
     <a:extraClrScheme>
-      <a:clrScheme name="Default Design 7">
+      <a:clrScheme name="A Common Love (welcome song) 7">
         <a:dk1>
           <a:srgbClr val="5C1F00"/>
         </a:dk1>
@@ -5357,7 +4793,7 @@
       <a:clrMap bg1="dk2" tx1="lt1" bg2="dk1" tx2="lt2" accent1="accent1" accent2="accent2" accent3="accent3" accent4="accent4" accent5="accent5" accent6="accent6" hlink="hlink" folHlink="folHlink"/>
     </a:extraClrScheme>
     <a:extraClrScheme>
-      <a:clrScheme name="Default Design 8">
+      <a:clrScheme name="A Common Love (welcome song) 8">
         <a:dk1>
           <a:srgbClr val="003366"/>
         </a:dk1>
@@ -5398,7 +4834,7 @@
       <a:clrMap bg1="dk2" tx1="lt1" bg2="dk1" tx2="lt2" accent1="accent1" accent2="accent2" accent3="accent3" accent4="accent4" accent5="accent5" accent6="accent6" hlink="hlink" folHlink="folHlink"/>
     </a:extraClrScheme>
     <a:extraClrScheme>
-      <a:clrScheme name="Default Design 9">
+      <a:clrScheme name="A Common Love (welcome song) 9">
         <a:dk1>
           <a:srgbClr val="336699"/>
         </a:dk1>
@@ -5439,7 +4875,7 @@
       <a:clrMap bg1="dk2" tx1="lt1" bg2="dk1" tx2="lt2" accent1="accent1" accent2="accent2" accent3="accent3" accent4="accent4" accent5="accent5" accent6="accent6" hlink="hlink" folHlink="folHlink"/>
     </a:extraClrScheme>
     <a:extraClrScheme>
-      <a:clrScheme name="Default Design 10">
+      <a:clrScheme name="A Common Love (welcome song) 10">
         <a:dk1>
           <a:srgbClr val="777777"/>
         </a:dk1>
@@ -5480,7 +4916,7 @@
       <a:clrMap bg1="dk2" tx1="lt1" bg2="dk1" tx2="lt2" accent1="accent1" accent2="accent2" accent3="accent3" accent4="accent4" accent5="accent5" accent6="accent6" hlink="hlink" folHlink="folHlink"/>
     </a:extraClrScheme>
     <a:extraClrScheme>
-      <a:clrScheme name="Default Design 11">
+      <a:clrScheme name="A Common Love (welcome song) 11">
         <a:dk1>
           <a:srgbClr val="3E3E5C"/>
         </a:dk1>
@@ -5521,7 +4957,7 @@
       <a:clrMap bg1="dk2" tx1="lt1" bg2="dk1" tx2="lt2" accent1="accent1" accent2="accent2" accent3="accent3" accent4="accent4" accent5="accent5" accent6="accent6" hlink="hlink" folHlink="folHlink"/>
     </a:extraClrScheme>
     <a:extraClrScheme>
-      <a:clrScheme name="Default Design 12">
+      <a:clrScheme name="A Common Love (welcome song) 12">
         <a:dk1>
           <a:srgbClr val="2D2015"/>
         </a:dk1>

</xml_diff>